<commit_message>
Updated Keystone DH Presentation File, shortened and adapted for our non-TEI audience
</commit_message>
<xml_diff>
--- a/Conference_prep/Amadis_KeystoneDH_conf_images.pptx
+++ b/Conference_prep/Amadis_KeystoneDH_conf_images.pptx
@@ -5,7 +5,7 @@
     <p:sldMasterId id="2147483846" r:id="rId1"/>
   </p:sldMasterIdLst>
   <p:notesMasterIdLst>
-    <p:notesMasterId r:id="rId24"/>
+    <p:notesMasterId r:id="rId19"/>
   </p:notesMasterIdLst>
   <p:sldIdLst>
     <p:sldId id="283" r:id="rId2"/>
@@ -18,18 +18,13 @@
     <p:sldId id="259" r:id="rId9"/>
     <p:sldId id="263" r:id="rId10"/>
     <p:sldId id="264" r:id="rId11"/>
-    <p:sldId id="285" r:id="rId12"/>
-    <p:sldId id="290" r:id="rId13"/>
-    <p:sldId id="287" r:id="rId14"/>
-    <p:sldId id="286" r:id="rId15"/>
-    <p:sldId id="291" r:id="rId16"/>
-    <p:sldId id="284" r:id="rId17"/>
-    <p:sldId id="288" r:id="rId18"/>
-    <p:sldId id="261" r:id="rId19"/>
-    <p:sldId id="268" r:id="rId20"/>
-    <p:sldId id="292" r:id="rId21"/>
-    <p:sldId id="269" r:id="rId22"/>
-    <p:sldId id="293" r:id="rId23"/>
+    <p:sldId id="287" r:id="rId12"/>
+    <p:sldId id="284" r:id="rId13"/>
+    <p:sldId id="261" r:id="rId14"/>
+    <p:sldId id="292" r:id="rId15"/>
+    <p:sldId id="269" r:id="rId16"/>
+    <p:sldId id="288" r:id="rId17"/>
+    <p:sldId id="293" r:id="rId18"/>
   </p:sldIdLst>
   <p:sldSz cx="9144000" cy="6858000" type="screen4x3"/>
   <p:notesSz cx="6858000" cy="9144000"/>
@@ -543,13 +538,38 @@
           <a:p>
             <a:r>
               <a:rPr lang="en-US" dirty="0" smtClean="0"/>
-              <a:t>About page from</a:t>
+              <a:t>Stacey and</a:t>
             </a:r>
             <a:r>
               <a:rPr lang="en-US" baseline="0" dirty="0" smtClean="0"/>
-              <a:t> our website, which we are currently building</a:t>
-            </a:r>
-            <a:endParaRPr lang="en-US" dirty="0"/>
+              <a:t> Elisa: Why do we work on this? How did we join this project</a:t>
+            </a:r>
+          </a:p>
+          <a:p>
+            <a:endParaRPr lang="en-US" baseline="0" dirty="0" smtClean="0"/>
+          </a:p>
+          <a:p>
+            <a:pPr marL="342900" indent="-342900">
+              <a:buFont typeface="Arial" panose="020B0604020202020204" pitchFamily="34" charset="0"/>
+              <a:buChar char="•"/>
+            </a:pPr>
+            <a:r>
+              <a:rPr lang="en-US" sz="1200" b="1" dirty="0" smtClean="0"/>
+              <a:t>What does the life cycle and translation cycle of </a:t>
+            </a:r>
+            <a:r>
+              <a:rPr lang="en-US" sz="1200" b="1" dirty="0" err="1" smtClean="0"/>
+              <a:t>Amadis</a:t>
+            </a:r>
+            <a:r>
+              <a:rPr lang="en-US" sz="1200" b="1" dirty="0" smtClean="0"/>
+              <a:t> tell us about the way fiction is translated across genres, cultures, centuries</a:t>
+            </a:r>
+            <a:r>
+              <a:rPr lang="en-US" b="1" dirty="0" smtClean="0"/>
+              <a:t>?</a:t>
+            </a:r>
+            <a:endParaRPr lang="en-US" sz="1200" b="1" dirty="0" smtClean="0"/>
           </a:p>
         </p:txBody>
       </p:sp>
@@ -634,12 +654,8 @@
           <a:lstStyle/>
           <a:p>
             <a:r>
-              <a:rPr lang="en-US" b="1" dirty="0" smtClean="0"/>
-              <a:t>Elisa:</a:t>
-            </a:r>
-            <a:r>
               <a:rPr lang="en-US" b="1" baseline="0" dirty="0" smtClean="0"/>
-              <a:t>  Southey’s text is available from a </a:t>
+              <a:t>Elisa: Southey’s text is available from a </a:t>
             </a:r>
             <a:r>
               <a:rPr lang="en-US" b="1" baseline="0" dirty="0" err="1" smtClean="0"/>
@@ -647,7 +663,15 @@
             </a:r>
             <a:r>
               <a:rPr lang="en-US" b="1" baseline="0" dirty="0" smtClean="0"/>
-              <a:t> source which we’ve been correcting against a published edition of his 1803 text. However, Montalvo’s text isn’t available in any machine readable format, so we’ve been transcribing that by hand. We then applied regular expressions to add &lt;cl&gt; elements at </a:t>
+              <a:t> source which we’ve been correcting against a published edition of his 1803 text. However, </a:t>
+            </a:r>
+            <a:r>
+              <a:rPr lang="en-US" b="1" baseline="0" dirty="0" err="1" smtClean="0"/>
+              <a:t>Montalvo’s</a:t>
+            </a:r>
+            <a:r>
+              <a:rPr lang="en-US" b="1" baseline="0" dirty="0" smtClean="0"/>
+              <a:t> text isn’t available in any machine readable format, so we’ve been transcribing that by hand. We then applied regular expressions to add &lt;cl&gt; elements at </a:t>
             </a:r>
             <a:r>
               <a:rPr lang="en-US" b="1" baseline="0" dirty="0" err="1" smtClean="0"/>
@@ -655,9 +679,96 @@
             </a:r>
             <a:r>
               <a:rPr lang="en-US" b="1" baseline="0" dirty="0" smtClean="0"/>
-              <a:t> clause-like unit boundaries. (And of course we had an easier time with preparing &lt;s&gt; elements to Southey.</a:t>
-            </a:r>
-            <a:endParaRPr lang="en-US" b="1" dirty="0"/>
+              <a:t> clause-like unit boundaries. (And of course we had an easier time with preparing &lt;s&gt; elements to Southey. </a:t>
+            </a:r>
+            <a:endParaRPr lang="en-US" b="1" dirty="0" smtClean="0"/>
+          </a:p>
+          <a:p>
+            <a:pPr marL="0" marR="0" indent="0" algn="l" defTabSz="457200" rtl="0" eaLnBrk="1" fontAlgn="auto" latinLnBrk="0" hangingPunct="1">
+              <a:lnSpc>
+                <a:spcPct val="100000"/>
+              </a:lnSpc>
+              <a:spcBef>
+                <a:spcPts val="0"/>
+              </a:spcBef>
+              <a:spcAft>
+                <a:spcPts val="0"/>
+              </a:spcAft>
+              <a:buClrTx/>
+              <a:buSzTx/>
+              <a:buFontTx/>
+              <a:buNone/>
+              <a:tabLst/>
+              <a:defRPr/>
+            </a:pPr>
+            <a:endParaRPr lang="en-US" dirty="0" smtClean="0"/>
+          </a:p>
+          <a:p>
+            <a:pPr marL="0" marR="0" indent="0" algn="l" defTabSz="457200" rtl="0" eaLnBrk="1" fontAlgn="auto" latinLnBrk="0" hangingPunct="1">
+              <a:lnSpc>
+                <a:spcPct val="100000"/>
+              </a:lnSpc>
+              <a:spcBef>
+                <a:spcPts val="0"/>
+              </a:spcBef>
+              <a:spcAft>
+                <a:spcPts val="0"/>
+              </a:spcAft>
+              <a:buClrTx/>
+              <a:buSzTx/>
+              <a:buFontTx/>
+              <a:buNone/>
+              <a:tabLst/>
+              <a:defRPr/>
+            </a:pPr>
+            <a:endParaRPr lang="en-US" dirty="0" smtClean="0"/>
+          </a:p>
+          <a:p>
+            <a:pPr marL="0" marR="0" indent="0" algn="l" defTabSz="457200" rtl="0" eaLnBrk="1" fontAlgn="auto" latinLnBrk="0" hangingPunct="1">
+              <a:lnSpc>
+                <a:spcPct val="100000"/>
+              </a:lnSpc>
+              <a:spcBef>
+                <a:spcPts val="0"/>
+              </a:spcBef>
+              <a:spcAft>
+                <a:spcPts val="0"/>
+              </a:spcAft>
+              <a:buClrTx/>
+              <a:buSzTx/>
+              <a:buFontTx/>
+              <a:buNone/>
+              <a:tabLst/>
+              <a:defRPr/>
+            </a:pPr>
+            <a:r>
+              <a:rPr lang="en-US" dirty="0" smtClean="0"/>
+              <a:t>Elisa</a:t>
+            </a:r>
+            <a:r>
+              <a:rPr lang="en-US" dirty="0" smtClean="0"/>
+              <a:t>:</a:t>
+            </a:r>
+            <a:r>
+              <a:rPr lang="en-US" baseline="0" dirty="0" smtClean="0"/>
+              <a:t> The next slides show our first results in comparing Southey’s translation to the Montalvo text. Here’s w</a:t>
+            </a:r>
+            <a:r>
+              <a:rPr lang="en-US" dirty="0" smtClean="0"/>
+              <a:t>hat we’re learning so far</a:t>
+            </a:r>
+            <a:r>
+              <a:rPr lang="en-US" baseline="0" dirty="0" smtClean="0"/>
+              <a:t>. As we are designing our website, we want to use this page as our table of  contents, so that our site visitors can quickly identify the chapters most altered by Southey. The orange band in the center indicates the proportion of overlap. The word count comparisons interest us, though we are not sure how significant they are: We are interested in gauging the extent of Southey’s boasted “compression” of Montalvo, so we use XSLT to generate these graphs by counting white spaces for makeshift word counts in between &lt;anchor/&gt; elements of different kinds. Where Southey omitted passages we don’t apply tags, but we note where he skips over unit passages in Montalvo. </a:t>
+            </a:r>
+            <a:r>
+              <a:rPr lang="en-US" baseline="0" dirty="0" smtClean="0"/>
+              <a:t>   </a:t>
+            </a:r>
+            <a:endParaRPr lang="en-US" dirty="0" smtClean="0"/>
+          </a:p>
+          <a:p>
+            <a:endParaRPr lang="en-US" dirty="0"/>
           </a:p>
         </p:txBody>
       </p:sp>
@@ -742,14 +853,103 @@
           <a:lstStyle/>
           <a:p>
             <a:r>
-              <a:rPr lang="en-US" b="1" dirty="0" smtClean="0"/>
-              <a:t>Elisa:</a:t>
+              <a:rPr lang="en-US" dirty="0" smtClean="0"/>
+              <a:t>Output</a:t>
+            </a:r>
+            <a:r>
+              <a:rPr lang="en-US" baseline="0" dirty="0" smtClean="0"/>
+              <a:t> table by Helena </a:t>
+            </a:r>
+            <a:r>
+              <a:rPr lang="en-US" baseline="0" dirty="0" err="1" smtClean="0"/>
+              <a:t>Bermúdez</a:t>
+            </a:r>
+            <a:r>
+              <a:rPr lang="en-US" baseline="0" dirty="0" smtClean="0"/>
+              <a:t> Sabel: This is an HTML view pulled from our feature structures markup for a chapter. The higher the number, the more compression Southey applied.</a:t>
+            </a:r>
+          </a:p>
+          <a:p>
+            <a:endParaRPr lang="en-US" dirty="0" smtClean="0"/>
+          </a:p>
+          <a:p>
+            <a:pPr marL="0" marR="0" indent="0" algn="l" defTabSz="457200" rtl="0" eaLnBrk="1" fontAlgn="auto" latinLnBrk="0" hangingPunct="1">
+              <a:lnSpc>
+                <a:spcPct val="100000"/>
+              </a:lnSpc>
+              <a:spcBef>
+                <a:spcPts val="0"/>
+              </a:spcBef>
+              <a:spcAft>
+                <a:spcPts val="0"/>
+              </a:spcAft>
+              <a:buClrTx/>
+              <a:buSzTx/>
+              <a:buFontTx/>
+              <a:buNone/>
+              <a:tabLst/>
+              <a:defRPr/>
+            </a:pPr>
+            <a:r>
+              <a:rPr lang="en-US" b="0" dirty="0" smtClean="0"/>
+              <a:t>Elisa: To</a:t>
+            </a:r>
+            <a:r>
+              <a:rPr lang="en-US" b="0" baseline="0" dirty="0" smtClean="0"/>
+              <a:t> analyze the aligned passages further, and help Stacey to survey them to plot patterns, we make an additional TEI file corresponding to each chapter, using the TEI’s handy </a:t>
             </a:r>
             <a:r>
               <a:rPr lang="en-US" b="1" baseline="0" dirty="0" smtClean="0"/>
-              <a:t> We then wrote XSLT to construct human-readable XML:IDs sitting at the chapter and clause levels of the text. Floating texts were designated for representations of texts within the text, and they’re given distinct XML:ID to indicate their special status. </a:t>
-            </a:r>
-            <a:endParaRPr lang="en-US" b="1" dirty="0"/>
+              <a:t>feature structures markup, </a:t>
+            </a:r>
+            <a:r>
+              <a:rPr lang="en-US" b="0" baseline="0" dirty="0" smtClean="0"/>
+              <a:t>to extract each Southey passage, and where it’s in sync, we set it next to the corresponding passage in </a:t>
+            </a:r>
+            <a:r>
+              <a:rPr lang="en-US" b="0" baseline="0" dirty="0" err="1" smtClean="0"/>
+              <a:t>Montalvo</a:t>
+            </a:r>
+            <a:r>
+              <a:rPr lang="en-US" b="0" baseline="0" dirty="0" smtClean="0"/>
+              <a:t> to produce one Feature Structure file for each chapter. @n indicates a word count, and @</a:t>
+            </a:r>
+            <a:r>
+              <a:rPr lang="en-US" b="0" baseline="0" dirty="0" err="1" smtClean="0"/>
+              <a:t>ana</a:t>
+            </a:r>
+            <a:r>
+              <a:rPr lang="en-US" b="0" baseline="0" dirty="0" smtClean="0"/>
+              <a:t> indicates by how much proportionally the passage was either compressed or expanded from a corresponding passage in </a:t>
+            </a:r>
+            <a:r>
+              <a:rPr lang="en-US" b="0" baseline="0" dirty="0" err="1" smtClean="0"/>
+              <a:t>Montalvo</a:t>
+            </a:r>
+            <a:r>
+              <a:rPr lang="en-US" b="0" baseline="0" dirty="0" smtClean="0"/>
+              <a:t>. Within an </a:t>
+            </a:r>
+            <a:r>
+              <a:rPr lang="en-US" b="0" baseline="0" dirty="0" err="1" smtClean="0"/>
+              <a:t>fs</a:t>
+            </a:r>
+            <a:r>
+              <a:rPr lang="en-US" b="0" baseline="0" dirty="0" smtClean="0"/>
+              <a:t> element we pull each “anchored event” (so to speak) from Southey,, and where these are not additions or omissions, they contain side-by-side units of matched text. We add a &lt;string&gt; element for writing in our comments on the translation, and we plan to develop a system of classifying the kinds of alterations Southey makes in his version of the translation. For example (though this is not shown), we find that frequently </a:t>
+            </a:r>
+            <a:r>
+              <a:rPr lang="en-US" b="0" baseline="0" dirty="0" err="1" smtClean="0"/>
+              <a:t>Montalvo</a:t>
+            </a:r>
+            <a:r>
+              <a:rPr lang="en-US" b="0" baseline="0" dirty="0" smtClean="0"/>
+              <a:t> represents every speech-act directly, while Southey turns this in to indirect discourse. He is likely making changes in the syntax, too. </a:t>
+            </a:r>
+            <a:endParaRPr lang="en-US" b="0" dirty="0" smtClean="0"/>
+          </a:p>
+          <a:p>
+            <a:endParaRPr lang="en-US" dirty="0"/>
           </a:p>
         </p:txBody>
       </p:sp>
@@ -779,7 +979,7 @@
     </p:spTree>
     <p:extLst>
       <p:ext uri="{BB962C8B-B14F-4D97-AF65-F5344CB8AC3E}">
-        <p14:creationId xmlns:p14="http://schemas.microsoft.com/office/powerpoint/2010/main" val="3319178909"/>
+        <p14:creationId xmlns:p14="http://schemas.microsoft.com/office/powerpoint/2010/main" val="147813387"/>
       </p:ext>
     </p:extLst>
   </p:cSld>
@@ -833,42 +1033,22 @@
           <a:bodyPr/>
           <a:lstStyle/>
           <a:p>
-            <a:pPr marL="0" marR="0" indent="0" algn="l" defTabSz="457200" rtl="0" eaLnBrk="1" fontAlgn="auto" latinLnBrk="0" hangingPunct="1">
-              <a:lnSpc>
-                <a:spcPct val="100000"/>
-              </a:lnSpc>
-              <a:spcBef>
-                <a:spcPts val="0"/>
-              </a:spcBef>
-              <a:spcAft>
-                <a:spcPts val="0"/>
-              </a:spcAft>
-              <a:buClrTx/>
-              <a:buSzTx/>
-              <a:buFontTx/>
-              <a:buNone/>
-              <a:tabLst/>
-              <a:defRPr/>
-            </a:pPr>
             <a:r>
               <a:rPr lang="en-US" dirty="0" smtClean="0"/>
-              <a:t>Elisa:</a:t>
+              <a:t>Image 9: From </a:t>
+            </a:r>
+            <a:r>
+              <a:rPr lang="en-US" dirty="0" err="1" smtClean="0"/>
+              <a:t>Montalvo</a:t>
+            </a:r>
+            <a:r>
+              <a:rPr lang="en-US" dirty="0" smtClean="0"/>
+              <a:t> 20/ Southey 21. Show where</a:t>
             </a:r>
             <a:r>
               <a:rPr lang="en-US" baseline="0" dirty="0" smtClean="0"/>
-              <a:t> The next slides show our first results in comparing Southey’s translation to the Montalvo text. Here’s w</a:t>
-            </a:r>
-            <a:r>
-              <a:rPr lang="en-US" dirty="0" smtClean="0"/>
-              <a:t>hat we’re learning so far</a:t>
-            </a:r>
-            <a:r>
-              <a:rPr lang="en-US" baseline="0" dirty="0" smtClean="0"/>
-              <a:t>. As we are designing our website, we want to use this page as our table of  contents, so that our site visitors can quickly identify the chapters most altered by Southey. The orange band in the center indicates the proportion of overlap. The word count comparisons interest us, though we are not sure how significant they are: We are interested in gauging the extent of Southey’s boasted “compression” of Montalvo, so we use XSLT to generate these graphs by counting white spaces for makeshift word counts in between &lt;anchor/&gt; elements of different kinds. Where Southey omitted passages we don’t apply tags, but we note where he skips over unit passages in Montalvo. </a:t>
-            </a:r>
-            <a:endParaRPr lang="en-US" dirty="0" smtClean="0"/>
-          </a:p>
-          <a:p>
+              <a:t> this corresponds—this is typical of Southey’s omission criteria. Repetition, participation of minor characters.</a:t>
+            </a:r>
             <a:endParaRPr lang="en-US" dirty="0"/>
           </a:p>
         </p:txBody>
@@ -954,30 +1134,14 @@
           <a:lstStyle/>
           <a:p>
             <a:r>
-              <a:rPr lang="en-US" b="0" dirty="0" smtClean="0"/>
-              <a:t>To</a:t>
-            </a:r>
-            <a:r>
-              <a:rPr lang="en-US" b="0" baseline="0" dirty="0" smtClean="0"/>
-              <a:t> analyze the aligned passages further, and help Stacey to survey them to plot patterns, we make an additional TEI file corresponding to each chapter, using the TEI’s handy </a:t>
-            </a:r>
-            <a:r>
-              <a:rPr lang="en-US" b="1" baseline="0" dirty="0" smtClean="0"/>
-              <a:t>feature structures markup, </a:t>
-            </a:r>
-            <a:r>
-              <a:rPr lang="en-US" b="0" baseline="0" dirty="0" smtClean="0"/>
-              <a:t>to extract each Southey passage, and where it’s in sync, we set it next to the corresponding passage in Montalvo to produce one Feature Structure file for each chapter. @n indicates a word count, and @</a:t>
-            </a:r>
-            <a:r>
-              <a:rPr lang="en-US" b="0" baseline="0" dirty="0" err="1" smtClean="0"/>
-              <a:t>ana</a:t>
-            </a:r>
-            <a:r>
-              <a:rPr lang="en-US" b="0" baseline="0" dirty="0" smtClean="0"/>
-              <a:t> indicates by how much proportionally the passage was either compressed or expanded from a corresponding passage in Montalvo. Within an fs element we pull each “anchored event” (so to speak) from Southey,, and where these are not additions or omissions, they contain side-by-side units of matched text. We add a &lt;string&gt; element for writing in our comments on the translation, and we plan to develop a system of classifying the kinds of alterations Southey makes in his version of the translation. For example (though this is not shown), we find that frequently Montalvo represents every speech-act directly, while Southey turns this in to indirect discourse. He is likely making changes in the syntax, too. </a:t>
-            </a:r>
-            <a:endParaRPr lang="en-US" b="0" dirty="0"/>
+              <a:rPr lang="en-US" dirty="0" smtClean="0"/>
+              <a:t>The</a:t>
+            </a:r>
+            <a:r>
+              <a:rPr lang="en-US" baseline="0" dirty="0" smtClean="0"/>
+              <a:t> same note in the published 1803 Southey text.</a:t>
+            </a:r>
+            <a:endParaRPr lang="en-US" dirty="0"/>
           </a:p>
         </p:txBody>
       </p:sp>
@@ -1007,7 +1171,7 @@
     </p:spTree>
     <p:extLst>
       <p:ext uri="{BB962C8B-B14F-4D97-AF65-F5344CB8AC3E}">
-        <p14:creationId xmlns:p14="http://schemas.microsoft.com/office/powerpoint/2010/main" val="147813387"/>
+        <p14:creationId xmlns:p14="http://schemas.microsoft.com/office/powerpoint/2010/main" val="2067100455"/>
       </p:ext>
     </p:extLst>
   </p:cSld>
@@ -1063,27 +1227,25 @@
           <a:p>
             <a:r>
               <a:rPr lang="en-US" dirty="0" smtClean="0"/>
-              <a:t>Generating</a:t>
+              <a:t>First note references the Spanish. It’s one of the few examples we’ve found of a misreading or mistranslation</a:t>
             </a:r>
             <a:r>
               <a:rPr lang="en-US" baseline="0" dirty="0" smtClean="0"/>
-              <a:t> Feature Structures markup: just the “f’ element and @</a:t>
-            </a:r>
-            <a:r>
-              <a:rPr lang="en-US" baseline="0" dirty="0" err="1" smtClean="0"/>
-              <a:t>ana</a:t>
+              <a:t> by Southey.</a:t>
+            </a:r>
+            <a:r>
+              <a:rPr lang="en-US" dirty="0" smtClean="0"/>
+              <a:t> Second note references</a:t>
             </a:r>
             <a:r>
               <a:rPr lang="en-US" baseline="0" dirty="0" smtClean="0"/>
-              <a:t>: How we’re calculating @</a:t>
-            </a:r>
-            <a:r>
-              <a:rPr lang="en-US" baseline="0" dirty="0" err="1" smtClean="0"/>
-              <a:t>ana</a:t>
-            </a:r>
-            <a:r>
-              <a:rPr lang="en-US" baseline="0" dirty="0" smtClean="0"/>
-              <a:t>, our signal of proportional difference in size between Montalvo and Southey. (The function round-half-to-even() can take two arguments—the “2” at the end indicates the number of decimal places.)</a:t>
+              <a:t> another translation. </a:t>
+            </a:r>
+          </a:p>
+          <a:p>
+            <a:r>
+              <a:rPr lang="en-US" b="1" baseline="0" dirty="0" smtClean="0"/>
+              <a:t>Pass to Elisa: go to previous slide. </a:t>
             </a:r>
             <a:endParaRPr lang="en-US" b="1" dirty="0"/>
           </a:p>
@@ -1115,7 +1277,7 @@
     </p:spTree>
     <p:extLst>
       <p:ext uri="{BB962C8B-B14F-4D97-AF65-F5344CB8AC3E}">
-        <p14:creationId xmlns:p14="http://schemas.microsoft.com/office/powerpoint/2010/main" val="3631775004"/>
+        <p14:creationId xmlns:p14="http://schemas.microsoft.com/office/powerpoint/2010/main" val="147813387"/>
       </p:ext>
     </p:extLst>
   </p:cSld>
@@ -1171,46 +1333,21 @@
           <a:p>
             <a:r>
               <a:rPr lang="en-US" dirty="0" smtClean="0"/>
-              <a:t>Output</a:t>
-            </a:r>
-            <a:r>
-              <a:rPr lang="en-US" baseline="0" dirty="0" smtClean="0"/>
-              <a:t> table by Helena </a:t>
-            </a:r>
-            <a:r>
-              <a:rPr lang="en-US" baseline="0" dirty="0" err="1" smtClean="0"/>
-              <a:t>Bermúdez</a:t>
-            </a:r>
-            <a:r>
-              <a:rPr lang="en-US" baseline="0" dirty="0" smtClean="0"/>
-              <a:t> Sabel: This is an HTML view pulled from our feature structures markup for a chapter. The higher the number, the more compression Southey applied.</a:t>
-            </a:r>
-          </a:p>
-          <a:p>
-            <a:pPr marL="0" marR="0" indent="0" algn="l" defTabSz="457200" rtl="0" eaLnBrk="1" fontAlgn="auto" latinLnBrk="0" hangingPunct="1">
-              <a:lnSpc>
-                <a:spcPct val="100000"/>
-              </a:lnSpc>
-              <a:spcBef>
-                <a:spcPts val="0"/>
-              </a:spcBef>
-              <a:spcAft>
-                <a:spcPts val="0"/>
-              </a:spcAft>
-              <a:buClrTx/>
-              <a:buSzTx/>
-              <a:buFontTx/>
-              <a:buNone/>
-              <a:tabLst/>
-              <a:defRPr/>
-            </a:pPr>
-            <a:r>
-              <a:rPr lang="en-US" b="1" baseline="0" smtClean="0"/>
-              <a:t>BACK to Stacey</a:t>
-            </a:r>
-            <a:endParaRPr lang="en-US" b="1" smtClean="0"/>
-          </a:p>
-          <a:p>
+              <a:t>From the Preface (xxi</a:t>
+            </a:r>
+            <a:r>
+              <a:rPr lang="en-US" dirty="0" smtClean="0"/>
+              <a:t>)</a:t>
+            </a:r>
+          </a:p>
+          <a:p>
+            <a:endParaRPr lang="en-US" dirty="0" smtClean="0"/>
+          </a:p>
+          <a:p>
+            <a:r>
+              <a:rPr lang="en-US" dirty="0" smtClean="0"/>
+              <a:t>Talk about whether Southey is a good translator</a:t>
+            </a:r>
             <a:endParaRPr lang="en-US" dirty="0"/>
           </a:p>
         </p:txBody>
@@ -1295,11 +1432,7 @@
           <a:bodyPr/>
           <a:lstStyle/>
           <a:p>
-            <a:r>
-              <a:rPr lang="en-US" dirty="0" smtClean="0"/>
-              <a:t>From the Preface (xxi)</a:t>
-            </a:r>
-            <a:endParaRPr lang="en-US" dirty="0"/>
+            <a:endParaRPr lang="en-US" b="1" dirty="0"/>
           </a:p>
         </p:txBody>
       </p:sp>
@@ -1329,334 +1462,7 @@
     </p:spTree>
     <p:extLst>
       <p:ext uri="{BB962C8B-B14F-4D97-AF65-F5344CB8AC3E}">
-        <p14:creationId xmlns:p14="http://schemas.microsoft.com/office/powerpoint/2010/main" val="147813387"/>
-      </p:ext>
-    </p:extLst>
-  </p:cSld>
-  <p:clrMapOvr>
-    <a:masterClrMapping/>
-  </p:clrMapOvr>
-</p:notes>
-</file>
-
-<file path=ppt/notesSlides/notesSlide17.xml><?xml version="1.0" encoding="utf-8"?>
-<p:notes xmlns:a="http://schemas.openxmlformats.org/drawingml/2006/main" xmlns:r="http://schemas.openxmlformats.org/officeDocument/2006/relationships" xmlns:p="http://schemas.openxmlformats.org/presentationml/2006/main">
-  <p:cSld>
-    <p:spTree>
-      <p:nvGrpSpPr>
-        <p:cNvPr id="1" name=""/>
-        <p:cNvGrpSpPr/>
-        <p:nvPr/>
-      </p:nvGrpSpPr>
-      <p:grpSpPr>
-        <a:xfrm>
-          <a:off x="0" y="0"/>
-          <a:ext cx="0" cy="0"/>
-          <a:chOff x="0" y="0"/>
-          <a:chExt cx="0" cy="0"/>
-        </a:xfrm>
-      </p:grpSpPr>
-      <p:sp>
-        <p:nvSpPr>
-          <p:cNvPr id="2" name="Slide Image Placeholder 1"/>
-          <p:cNvSpPr>
-            <a:spLocks noGrp="1" noRot="1" noChangeAspect="1"/>
-          </p:cNvSpPr>
-          <p:nvPr>
-            <p:ph type="sldImg"/>
-          </p:nvPr>
-        </p:nvSpPr>
-        <p:spPr/>
-      </p:sp>
-      <p:sp>
-        <p:nvSpPr>
-          <p:cNvPr id="3" name="Notes Placeholder 2"/>
-          <p:cNvSpPr>
-            <a:spLocks noGrp="1"/>
-          </p:cNvSpPr>
-          <p:nvPr>
-            <p:ph type="body" idx="1"/>
-          </p:nvPr>
-        </p:nvSpPr>
-        <p:spPr/>
-        <p:txBody>
-          <a:bodyPr/>
-          <a:lstStyle/>
-          <a:p>
-            <a:r>
-              <a:rPr lang="en-US" dirty="0" smtClean="0"/>
-              <a:t>Image 9: From </a:t>
-            </a:r>
-            <a:r>
-              <a:rPr lang="en-US" dirty="0" err="1" smtClean="0"/>
-              <a:t>Montalvo</a:t>
-            </a:r>
-            <a:r>
-              <a:rPr lang="en-US" dirty="0" smtClean="0"/>
-              <a:t> 20/ Southey 21. Show where</a:t>
-            </a:r>
-            <a:r>
-              <a:rPr lang="en-US" baseline="0" dirty="0" smtClean="0"/>
-              <a:t> this corresponds—this is typical of Southey’s omission criteria. Repetition, participation of minor characters.</a:t>
-            </a:r>
-            <a:endParaRPr lang="en-US" dirty="0"/>
-          </a:p>
-        </p:txBody>
-      </p:sp>
-      <p:sp>
-        <p:nvSpPr>
-          <p:cNvPr id="4" name="Slide Number Placeholder 3"/>
-          <p:cNvSpPr>
-            <a:spLocks noGrp="1"/>
-          </p:cNvSpPr>
-          <p:nvPr>
-            <p:ph type="sldNum" sz="quarter" idx="10"/>
-          </p:nvPr>
-        </p:nvSpPr>
-        <p:spPr/>
-        <p:txBody>
-          <a:bodyPr/>
-          <a:lstStyle/>
-          <a:p>
-            <a:fld id="{F643181A-FD5F-E940-B6DC-320B23DAA7AA}" type="slidenum">
-              <a:rPr lang="en-US" smtClean="0"/>
-              <a:t>18</a:t>
-            </a:fld>
-            <a:endParaRPr lang="en-US"/>
-          </a:p>
-        </p:txBody>
-      </p:sp>
-    </p:spTree>
-    <p:extLst>
-      <p:ext uri="{BB962C8B-B14F-4D97-AF65-F5344CB8AC3E}">
-        <p14:creationId xmlns:p14="http://schemas.microsoft.com/office/powerpoint/2010/main" val="147813387"/>
-      </p:ext>
-    </p:extLst>
-  </p:cSld>
-  <p:clrMapOvr>
-    <a:masterClrMapping/>
-  </p:clrMapOvr>
-</p:notes>
-</file>
-
-<file path=ppt/notesSlides/notesSlide18.xml><?xml version="1.0" encoding="utf-8"?>
-<p:notes xmlns:a="http://schemas.openxmlformats.org/drawingml/2006/main" xmlns:r="http://schemas.openxmlformats.org/officeDocument/2006/relationships" xmlns:p="http://schemas.openxmlformats.org/presentationml/2006/main">
-  <p:cSld>
-    <p:spTree>
-      <p:nvGrpSpPr>
-        <p:cNvPr id="1" name=""/>
-        <p:cNvGrpSpPr/>
-        <p:nvPr/>
-      </p:nvGrpSpPr>
-      <p:grpSpPr>
-        <a:xfrm>
-          <a:off x="0" y="0"/>
-          <a:ext cx="0" cy="0"/>
-          <a:chOff x="0" y="0"/>
-          <a:chExt cx="0" cy="0"/>
-        </a:xfrm>
-      </p:grpSpPr>
-      <p:sp>
-        <p:nvSpPr>
-          <p:cNvPr id="2" name="Slide Image Placeholder 1"/>
-          <p:cNvSpPr>
-            <a:spLocks noGrp="1" noRot="1" noChangeAspect="1"/>
-          </p:cNvSpPr>
-          <p:nvPr>
-            <p:ph type="sldImg"/>
-          </p:nvPr>
-        </p:nvSpPr>
-        <p:spPr/>
-      </p:sp>
-      <p:sp>
-        <p:nvSpPr>
-          <p:cNvPr id="3" name="Notes Placeholder 2"/>
-          <p:cNvSpPr>
-            <a:spLocks noGrp="1"/>
-          </p:cNvSpPr>
-          <p:nvPr>
-            <p:ph type="body" idx="1"/>
-          </p:nvPr>
-        </p:nvSpPr>
-        <p:spPr/>
-        <p:txBody>
-          <a:bodyPr/>
-          <a:lstStyle/>
-          <a:p>
-            <a:pPr marL="0" marR="0" indent="0" algn="l" defTabSz="457200" rtl="0" eaLnBrk="1" fontAlgn="auto" latinLnBrk="0" hangingPunct="1">
-              <a:lnSpc>
-                <a:spcPct val="100000"/>
-              </a:lnSpc>
-              <a:spcBef>
-                <a:spcPts val="0"/>
-              </a:spcBef>
-              <a:spcAft>
-                <a:spcPts val="0"/>
-              </a:spcAft>
-              <a:buClrTx/>
-              <a:buSzTx/>
-              <a:buFontTx/>
-              <a:buNone/>
-              <a:tabLst/>
-              <a:defRPr/>
-            </a:pPr>
-            <a:r>
-              <a:rPr lang="en-US" b="1" baseline="0" dirty="0" smtClean="0"/>
-              <a:t>**Stacey introduces this slide and the next, and then Elisa backtracks here.</a:t>
-            </a:r>
-          </a:p>
-          <a:p>
-            <a:pPr marL="0" marR="0" indent="0" algn="l" defTabSz="457200" rtl="0" eaLnBrk="1" fontAlgn="auto" latinLnBrk="0" hangingPunct="1">
-              <a:lnSpc>
-                <a:spcPct val="100000"/>
-              </a:lnSpc>
-              <a:spcBef>
-                <a:spcPts val="0"/>
-              </a:spcBef>
-              <a:spcAft>
-                <a:spcPts val="0"/>
-              </a:spcAft>
-              <a:buClrTx/>
-              <a:buSzTx/>
-              <a:buFontTx/>
-              <a:buNone/>
-              <a:tabLst/>
-              <a:defRPr/>
-            </a:pPr>
-            <a:r>
-              <a:rPr lang="en-US" b="1" baseline="0" dirty="0" smtClean="0"/>
-              <a:t>Elisa: </a:t>
-            </a:r>
-            <a:r>
-              <a:rPr lang="en-US" b="0" baseline="0" dirty="0" smtClean="0"/>
-              <a:t>These notes recently sparked debate among our little project team, because we noticed that Southey sometimes positions short quotes from Montalvo’s Spanish with word-for-word translations in some of his notes: We questioned whether this constitutes an OMISSION of Montalvo’s text from the main text of Southey’s translation, OR if it’s a way of preserving the translation at a different level of the text. We decided that such passages constitute a transposed translation, and we want to collect and study them together…Southey’s annotations take the form of footnotes, and they often have a significant function as part of the main text </a:t>
-            </a:r>
-            <a:endParaRPr lang="en-US" b="1" dirty="0" smtClean="0"/>
-          </a:p>
-          <a:p>
-            <a:endParaRPr lang="en-US" dirty="0"/>
-          </a:p>
-        </p:txBody>
-      </p:sp>
-      <p:sp>
-        <p:nvSpPr>
-          <p:cNvPr id="4" name="Slide Number Placeholder 3"/>
-          <p:cNvSpPr>
-            <a:spLocks noGrp="1"/>
-          </p:cNvSpPr>
-          <p:nvPr>
-            <p:ph type="sldNum" sz="quarter" idx="10"/>
-          </p:nvPr>
-        </p:nvSpPr>
-        <p:spPr/>
-        <p:txBody>
-          <a:bodyPr/>
-          <a:lstStyle/>
-          <a:p>
-            <a:fld id="{F643181A-FD5F-E940-B6DC-320B23DAA7AA}" type="slidenum">
-              <a:rPr lang="en-US" smtClean="0"/>
-              <a:t>19</a:t>
-            </a:fld>
-            <a:endParaRPr lang="en-US"/>
-          </a:p>
-        </p:txBody>
-      </p:sp>
-    </p:spTree>
-    <p:extLst>
-      <p:ext uri="{BB962C8B-B14F-4D97-AF65-F5344CB8AC3E}">
-        <p14:creationId xmlns:p14="http://schemas.microsoft.com/office/powerpoint/2010/main" val="147813387"/>
-      </p:ext>
-    </p:extLst>
-  </p:cSld>
-  <p:clrMapOvr>
-    <a:masterClrMapping/>
-  </p:clrMapOvr>
-</p:notes>
-</file>
-
-<file path=ppt/notesSlides/notesSlide19.xml><?xml version="1.0" encoding="utf-8"?>
-<p:notes xmlns:a="http://schemas.openxmlformats.org/drawingml/2006/main" xmlns:r="http://schemas.openxmlformats.org/officeDocument/2006/relationships" xmlns:p="http://schemas.openxmlformats.org/presentationml/2006/main">
-  <p:cSld>
-    <p:spTree>
-      <p:nvGrpSpPr>
-        <p:cNvPr id="1" name=""/>
-        <p:cNvGrpSpPr/>
-        <p:nvPr/>
-      </p:nvGrpSpPr>
-      <p:grpSpPr>
-        <a:xfrm>
-          <a:off x="0" y="0"/>
-          <a:ext cx="0" cy="0"/>
-          <a:chOff x="0" y="0"/>
-          <a:chExt cx="0" cy="0"/>
-        </a:xfrm>
-      </p:grpSpPr>
-      <p:sp>
-        <p:nvSpPr>
-          <p:cNvPr id="2" name="Slide Image Placeholder 1"/>
-          <p:cNvSpPr>
-            <a:spLocks noGrp="1" noRot="1" noChangeAspect="1"/>
-          </p:cNvSpPr>
-          <p:nvPr>
-            <p:ph type="sldImg"/>
-          </p:nvPr>
-        </p:nvSpPr>
-        <p:spPr/>
-      </p:sp>
-      <p:sp>
-        <p:nvSpPr>
-          <p:cNvPr id="3" name="Notes Placeholder 2"/>
-          <p:cNvSpPr>
-            <a:spLocks noGrp="1"/>
-          </p:cNvSpPr>
-          <p:nvPr>
-            <p:ph type="body" idx="1"/>
-          </p:nvPr>
-        </p:nvSpPr>
-        <p:spPr/>
-        <p:txBody>
-          <a:bodyPr/>
-          <a:lstStyle/>
-          <a:p>
-            <a:r>
-              <a:rPr lang="en-US" dirty="0" smtClean="0"/>
-              <a:t>The</a:t>
-            </a:r>
-            <a:r>
-              <a:rPr lang="en-US" baseline="0" dirty="0" smtClean="0"/>
-              <a:t> same note in the published 1803 Southey text.</a:t>
-            </a:r>
-            <a:endParaRPr lang="en-US" dirty="0"/>
-          </a:p>
-        </p:txBody>
-      </p:sp>
-      <p:sp>
-        <p:nvSpPr>
-          <p:cNvPr id="4" name="Slide Number Placeholder 3"/>
-          <p:cNvSpPr>
-            <a:spLocks noGrp="1"/>
-          </p:cNvSpPr>
-          <p:nvPr>
-            <p:ph type="sldNum" sz="quarter" idx="10"/>
-          </p:nvPr>
-        </p:nvSpPr>
-        <p:spPr/>
-        <p:txBody>
-          <a:bodyPr/>
-          <a:lstStyle/>
-          <a:p>
-            <a:fld id="{F643181A-FD5F-E940-B6DC-320B23DAA7AA}" type="slidenum">
-              <a:rPr lang="en-US" smtClean="0"/>
-              <a:t>20</a:t>
-            </a:fld>
-            <a:endParaRPr lang="en-US"/>
-          </a:p>
-        </p:txBody>
-      </p:sp>
-    </p:spTree>
-    <p:extLst>
-      <p:ext uri="{BB962C8B-B14F-4D97-AF65-F5344CB8AC3E}">
-        <p14:creationId xmlns:p14="http://schemas.microsoft.com/office/powerpoint/2010/main" val="2067100455"/>
+        <p14:creationId xmlns:p14="http://schemas.microsoft.com/office/powerpoint/2010/main" val="1392790114"/>
       </p:ext>
     </p:extLst>
   </p:cSld>
@@ -1746,7 +1552,24 @@
             </a:r>
             <a:r>
               <a:rPr lang="en-US" baseline="0" dirty="0" smtClean="0"/>
-              <a:t>, would be the verso facing the recto title page)</a:t>
+              <a:t>, would be the verso facing the recto title page</a:t>
+            </a:r>
+            <a:r>
+              <a:rPr lang="en-US" baseline="0" dirty="0" smtClean="0"/>
+              <a:t>)</a:t>
+            </a:r>
+          </a:p>
+          <a:p>
+            <a:endParaRPr lang="en-US" baseline="0" dirty="0" smtClean="0"/>
+          </a:p>
+          <a:p>
+            <a:r>
+              <a:rPr lang="en-US" baseline="0" dirty="0" smtClean="0"/>
+              <a:t>ELISA: Southey thinks he has an Ur-text from Portugal, and he is going to produce a translation that comes closer to an original and simpler (less corrupt) Spanish translation. Southey was shaping a professional writing career as an English Protestant historian and epic poet, in the tradition of John Milton, and he’s a student of Catholic Spanish and Portuguese culture as a study of literary tradition that is struggling against a </a:t>
+            </a:r>
+            <a:r>
+              <a:rPr lang="en-US" baseline="0" smtClean="0"/>
+              <a:t>Catholic Inquisition. </a:t>
             </a:r>
             <a:endParaRPr lang="en-US" dirty="0"/>
           </a:p>
@@ -1779,196 +1602,6 @@
     <p:extLst>
       <p:ext uri="{BB962C8B-B14F-4D97-AF65-F5344CB8AC3E}">
         <p14:creationId xmlns:p14="http://schemas.microsoft.com/office/powerpoint/2010/main" val="2995728640"/>
-      </p:ext>
-    </p:extLst>
-  </p:cSld>
-  <p:clrMapOvr>
-    <a:masterClrMapping/>
-  </p:clrMapOvr>
-</p:notes>
-</file>
-
-<file path=ppt/notesSlides/notesSlide20.xml><?xml version="1.0" encoding="utf-8"?>
-<p:notes xmlns:a="http://schemas.openxmlformats.org/drawingml/2006/main" xmlns:r="http://schemas.openxmlformats.org/officeDocument/2006/relationships" xmlns:p="http://schemas.openxmlformats.org/presentationml/2006/main">
-  <p:cSld>
-    <p:spTree>
-      <p:nvGrpSpPr>
-        <p:cNvPr id="1" name=""/>
-        <p:cNvGrpSpPr/>
-        <p:nvPr/>
-      </p:nvGrpSpPr>
-      <p:grpSpPr>
-        <a:xfrm>
-          <a:off x="0" y="0"/>
-          <a:ext cx="0" cy="0"/>
-          <a:chOff x="0" y="0"/>
-          <a:chExt cx="0" cy="0"/>
-        </a:xfrm>
-      </p:grpSpPr>
-      <p:sp>
-        <p:nvSpPr>
-          <p:cNvPr id="2" name="Slide Image Placeholder 1"/>
-          <p:cNvSpPr>
-            <a:spLocks noGrp="1" noRot="1" noChangeAspect="1"/>
-          </p:cNvSpPr>
-          <p:nvPr>
-            <p:ph type="sldImg"/>
-          </p:nvPr>
-        </p:nvSpPr>
-        <p:spPr/>
-      </p:sp>
-      <p:sp>
-        <p:nvSpPr>
-          <p:cNvPr id="3" name="Notes Placeholder 2"/>
-          <p:cNvSpPr>
-            <a:spLocks noGrp="1"/>
-          </p:cNvSpPr>
-          <p:nvPr>
-            <p:ph type="body" idx="1"/>
-          </p:nvPr>
-        </p:nvSpPr>
-        <p:spPr/>
-        <p:txBody>
-          <a:bodyPr/>
-          <a:lstStyle/>
-          <a:p>
-            <a:r>
-              <a:rPr lang="en-US" dirty="0" smtClean="0"/>
-              <a:t>First note references the Spanish. It’s one of the few examples we’ve found of a misreading or mistranslation</a:t>
-            </a:r>
-            <a:r>
-              <a:rPr lang="en-US" baseline="0" dirty="0" smtClean="0"/>
-              <a:t> by Southey.</a:t>
-            </a:r>
-            <a:r>
-              <a:rPr lang="en-US" dirty="0" smtClean="0"/>
-              <a:t> Second note references</a:t>
-            </a:r>
-            <a:r>
-              <a:rPr lang="en-US" baseline="0" dirty="0" smtClean="0"/>
-              <a:t> another translation. </a:t>
-            </a:r>
-          </a:p>
-          <a:p>
-            <a:r>
-              <a:rPr lang="en-US" b="1" baseline="0" dirty="0" smtClean="0"/>
-              <a:t>Pass to Elisa: go to previous slide. </a:t>
-            </a:r>
-            <a:endParaRPr lang="en-US" b="1" dirty="0"/>
-          </a:p>
-        </p:txBody>
-      </p:sp>
-      <p:sp>
-        <p:nvSpPr>
-          <p:cNvPr id="4" name="Slide Number Placeholder 3"/>
-          <p:cNvSpPr>
-            <a:spLocks noGrp="1"/>
-          </p:cNvSpPr>
-          <p:nvPr>
-            <p:ph type="sldNum" sz="quarter" idx="10"/>
-          </p:nvPr>
-        </p:nvSpPr>
-        <p:spPr/>
-        <p:txBody>
-          <a:bodyPr/>
-          <a:lstStyle/>
-          <a:p>
-            <a:fld id="{F643181A-FD5F-E940-B6DC-320B23DAA7AA}" type="slidenum">
-              <a:rPr lang="en-US" smtClean="0"/>
-              <a:t>21</a:t>
-            </a:fld>
-            <a:endParaRPr lang="en-US"/>
-          </a:p>
-        </p:txBody>
-      </p:sp>
-    </p:spTree>
-    <p:extLst>
-      <p:ext uri="{BB962C8B-B14F-4D97-AF65-F5344CB8AC3E}">
-        <p14:creationId xmlns:p14="http://schemas.microsoft.com/office/powerpoint/2010/main" val="147813387"/>
-      </p:ext>
-    </p:extLst>
-  </p:cSld>
-  <p:clrMapOvr>
-    <a:masterClrMapping/>
-  </p:clrMapOvr>
-</p:notes>
-</file>
-
-<file path=ppt/notesSlides/notesSlide21.xml><?xml version="1.0" encoding="utf-8"?>
-<p:notes xmlns:a="http://schemas.openxmlformats.org/drawingml/2006/main" xmlns:r="http://schemas.openxmlformats.org/officeDocument/2006/relationships" xmlns:p="http://schemas.openxmlformats.org/presentationml/2006/main">
-  <p:cSld>
-    <p:spTree>
-      <p:nvGrpSpPr>
-        <p:cNvPr id="1" name=""/>
-        <p:cNvGrpSpPr/>
-        <p:nvPr/>
-      </p:nvGrpSpPr>
-      <p:grpSpPr>
-        <a:xfrm>
-          <a:off x="0" y="0"/>
-          <a:ext cx="0" cy="0"/>
-          <a:chOff x="0" y="0"/>
-          <a:chExt cx="0" cy="0"/>
-        </a:xfrm>
-      </p:grpSpPr>
-      <p:sp>
-        <p:nvSpPr>
-          <p:cNvPr id="2" name="Slide Image Placeholder 1"/>
-          <p:cNvSpPr>
-            <a:spLocks noGrp="1" noRot="1" noChangeAspect="1"/>
-          </p:cNvSpPr>
-          <p:nvPr>
-            <p:ph type="sldImg"/>
-          </p:nvPr>
-        </p:nvSpPr>
-        <p:spPr/>
-      </p:sp>
-      <p:sp>
-        <p:nvSpPr>
-          <p:cNvPr id="3" name="Notes Placeholder 2"/>
-          <p:cNvSpPr>
-            <a:spLocks noGrp="1"/>
-          </p:cNvSpPr>
-          <p:nvPr>
-            <p:ph type="body" idx="1"/>
-          </p:nvPr>
-        </p:nvSpPr>
-        <p:spPr/>
-        <p:txBody>
-          <a:bodyPr/>
-          <a:lstStyle/>
-          <a:p>
-            <a:endParaRPr lang="en-US" b="1" dirty="0"/>
-          </a:p>
-        </p:txBody>
-      </p:sp>
-      <p:sp>
-        <p:nvSpPr>
-          <p:cNvPr id="4" name="Slide Number Placeholder 3"/>
-          <p:cNvSpPr>
-            <a:spLocks noGrp="1"/>
-          </p:cNvSpPr>
-          <p:nvPr>
-            <p:ph type="sldNum" sz="quarter" idx="10"/>
-          </p:nvPr>
-        </p:nvSpPr>
-        <p:spPr/>
-        <p:txBody>
-          <a:bodyPr/>
-          <a:lstStyle/>
-          <a:p>
-            <a:fld id="{F643181A-FD5F-E940-B6DC-320B23DAA7AA}" type="slidenum">
-              <a:rPr lang="en-US" smtClean="0"/>
-              <a:t>22</a:t>
-            </a:fld>
-            <a:endParaRPr lang="en-US"/>
-          </a:p>
-        </p:txBody>
-      </p:sp>
-    </p:spTree>
-    <p:extLst>
-      <p:ext uri="{BB962C8B-B14F-4D97-AF65-F5344CB8AC3E}">
-        <p14:creationId xmlns:p14="http://schemas.microsoft.com/office/powerpoint/2010/main" val="1392790114"/>
       </p:ext>
     </p:extLst>
   </p:cSld>
@@ -6403,1724 +6036,6 @@
           <a:chExt cx="0" cy="0"/>
         </a:xfrm>
       </p:grpSpPr>
-      <p:sp>
-        <p:nvSpPr>
-          <p:cNvPr id="2" name="Content Placeholder 1"/>
-          <p:cNvSpPr>
-            <a:spLocks noGrp="1"/>
-          </p:cNvSpPr>
-          <p:nvPr>
-            <p:ph idx="1"/>
-          </p:nvPr>
-        </p:nvSpPr>
-        <p:spPr>
-          <a:xfrm>
-            <a:off x="187569" y="480447"/>
-            <a:ext cx="8739454" cy="6154815"/>
-          </a:xfrm>
-        </p:spPr>
-        <p:txBody>
-          <a:bodyPr>
-            <a:normAutofit fontScale="70000" lnSpcReduction="20000"/>
-          </a:bodyPr>
-          <a:lstStyle/>
-          <a:p>
-            <a:pPr marL="0" indent="0" algn="ctr">
-              <a:buNone/>
-            </a:pPr>
-            <a:r>
-              <a:rPr lang="en-US" sz="4500" dirty="0" smtClean="0"/>
-              <a:t>Regex for Up-Conversion</a:t>
-            </a:r>
-            <a:endParaRPr lang="en-US" sz="4500" dirty="0"/>
-          </a:p>
-          <a:p>
-            <a:pPr marL="0" indent="0">
-              <a:buNone/>
-            </a:pPr>
-            <a:endParaRPr lang="en-US" dirty="0"/>
-          </a:p>
-          <a:p>
-            <a:pPr marL="0" indent="0">
-              <a:buNone/>
-            </a:pPr>
-            <a:r>
-              <a:rPr lang="en-US" dirty="0"/>
-              <a:t>To find ends of sentences: </a:t>
-            </a:r>
-            <a:r>
-              <a:rPr lang="en-US" dirty="0">
-                <a:solidFill>
-                  <a:srgbClr val="FF0000"/>
-                </a:solidFill>
-              </a:rPr>
-              <a:t>\.\s[A-Z] </a:t>
-            </a:r>
-            <a:r>
-              <a:rPr lang="en-US" dirty="0"/>
-              <a:t>Same with capturing groups: </a:t>
-            </a:r>
-            <a:r>
-              <a:rPr lang="en-US" dirty="0">
-                <a:solidFill>
-                  <a:srgbClr val="FF0000"/>
-                </a:solidFill>
-              </a:rPr>
-              <a:t>(\.)\s([A-Z])</a:t>
-            </a:r>
-          </a:p>
-          <a:p>
-            <a:pPr marL="0" indent="0">
-              <a:buNone/>
-            </a:pPr>
-            <a:endParaRPr lang="en-US" dirty="0"/>
-          </a:p>
-          <a:p>
-            <a:pPr marL="0" indent="0">
-              <a:buNone/>
-            </a:pPr>
-            <a:r>
-              <a:rPr lang="en-US" dirty="0"/>
-              <a:t>Replace with</a:t>
-            </a:r>
-            <a:r>
-              <a:rPr lang="en-US" dirty="0">
-                <a:solidFill>
-                  <a:srgbClr val="FF0000"/>
-                </a:solidFill>
-              </a:rPr>
-              <a:t>: \1&lt;/s&gt;&lt;s&gt;\2</a:t>
-            </a:r>
-          </a:p>
-          <a:p>
-            <a:pPr marL="0" indent="0">
-              <a:buNone/>
-            </a:pPr>
-            <a:endParaRPr lang="en-US" dirty="0"/>
-          </a:p>
-          <a:p>
-            <a:pPr marL="0" indent="0">
-              <a:buNone/>
-            </a:pPr>
-            <a:r>
-              <a:rPr lang="en-US" dirty="0"/>
-              <a:t>Some tips:</a:t>
-            </a:r>
-          </a:p>
-          <a:p>
-            <a:pPr marL="0" indent="0">
-              <a:buNone/>
-            </a:pPr>
-            <a:endParaRPr lang="en-US" dirty="0"/>
-          </a:p>
-          <a:p>
-            <a:pPr marL="0" indent="0">
-              <a:buNone/>
-            </a:pPr>
-            <a:r>
-              <a:rPr lang="en-US" dirty="0"/>
-              <a:t>1. Select the text of the transcription (so the regex is not applied to the header)</a:t>
-            </a:r>
-          </a:p>
-          <a:p>
-            <a:pPr marL="0" indent="0">
-              <a:buNone/>
-            </a:pPr>
-            <a:endParaRPr lang="en-US" dirty="0"/>
-          </a:p>
-          <a:p>
-            <a:pPr marL="0" indent="0">
-              <a:buNone/>
-            </a:pPr>
-            <a:r>
-              <a:rPr lang="en-US" dirty="0"/>
-              <a:t>2. Open the find and replace dialogue (Ctrl + F) and select “Selected lines only”</a:t>
-            </a:r>
-          </a:p>
-          <a:p>
-            <a:pPr marL="0" indent="0">
-              <a:buNone/>
-            </a:pPr>
-            <a:endParaRPr lang="en-US" dirty="0"/>
-          </a:p>
-          <a:p>
-            <a:pPr marL="0" indent="0">
-              <a:buNone/>
-            </a:pPr>
-            <a:r>
-              <a:rPr lang="en-US" dirty="0"/>
-              <a:t>3. Find: </a:t>
-            </a:r>
-            <a:r>
-              <a:rPr lang="en-US" dirty="0">
-                <a:solidFill>
-                  <a:srgbClr val="FF0000"/>
-                </a:solidFill>
-              </a:rPr>
-              <a:t>(\.|:|/|\?)\s</a:t>
-            </a:r>
-          </a:p>
-          <a:p>
-            <a:pPr marL="0" indent="0">
-              <a:buNone/>
-            </a:pPr>
-            <a:endParaRPr lang="en-US" dirty="0"/>
-          </a:p>
-          <a:p>
-            <a:pPr marL="0" indent="0">
-              <a:buNone/>
-            </a:pPr>
-            <a:r>
-              <a:rPr lang="en-US" dirty="0"/>
-              <a:t>4. Replace with: </a:t>
-            </a:r>
-            <a:r>
-              <a:rPr lang="en-US" dirty="0">
-                <a:solidFill>
-                  <a:srgbClr val="FF0000"/>
-                </a:solidFill>
-              </a:rPr>
-              <a:t>\1&lt;/cl&gt;\n&lt;cl&gt;</a:t>
-            </a:r>
-          </a:p>
-          <a:p>
-            <a:pPr marL="0" indent="0">
-              <a:buNone/>
-            </a:pPr>
-            <a:endParaRPr lang="en-US" dirty="0"/>
-          </a:p>
-          <a:p>
-            <a:pPr marL="0" indent="0">
-              <a:buNone/>
-            </a:pPr>
-            <a:r>
-              <a:rPr lang="en-US" dirty="0"/>
-              <a:t>5. Add a </a:t>
-            </a:r>
-            <a:r>
-              <a:rPr lang="en-US" dirty="0">
-                <a:solidFill>
-                  <a:srgbClr val="FF0000"/>
-                </a:solidFill>
-              </a:rPr>
-              <a:t>&lt;cl&gt; </a:t>
-            </a:r>
-            <a:r>
-              <a:rPr lang="en-US" dirty="0"/>
-              <a:t>just after the </a:t>
-            </a:r>
-            <a:r>
-              <a:rPr lang="en-US" dirty="0">
-                <a:solidFill>
-                  <a:srgbClr val="FF0000"/>
-                </a:solidFill>
-              </a:rPr>
-              <a:t>&lt;p&gt;</a:t>
-            </a:r>
-            <a:r>
-              <a:rPr lang="en-US" dirty="0"/>
-              <a:t> element and delete the </a:t>
-            </a:r>
-            <a:r>
-              <a:rPr lang="en-US" dirty="0">
-                <a:solidFill>
-                  <a:srgbClr val="FF0000"/>
-                </a:solidFill>
-              </a:rPr>
-              <a:t>&lt;cl&gt; </a:t>
-            </a:r>
-            <a:r>
-              <a:rPr lang="en-US" dirty="0"/>
-              <a:t>before the paragraph </a:t>
-            </a:r>
-            <a:r>
-              <a:rPr lang="en-US" dirty="0" smtClean="0"/>
-              <a:t>closing </a:t>
-            </a:r>
-            <a:r>
-              <a:rPr lang="en-US" dirty="0"/>
-              <a:t>tag </a:t>
-            </a:r>
-            <a:r>
-              <a:rPr lang="en-US" dirty="0">
-                <a:solidFill>
-                  <a:srgbClr val="FF0000"/>
-                </a:solidFill>
-              </a:rPr>
-              <a:t>&lt;/p&gt;</a:t>
-            </a:r>
-          </a:p>
-          <a:p>
-            <a:pPr marL="0" indent="0">
-              <a:buNone/>
-            </a:pPr>
-            <a:endParaRPr lang="en-US" dirty="0"/>
-          </a:p>
-          <a:p>
-            <a:pPr marL="0" indent="0">
-              <a:buNone/>
-            </a:pPr>
-            <a:r>
-              <a:rPr lang="en-US" dirty="0"/>
-              <a:t>Other things to remember: When there is a new clause that begins with a capital letter but punctuation is absent.</a:t>
-            </a:r>
-          </a:p>
-          <a:p>
-            <a:pPr marL="0" indent="0">
-              <a:buNone/>
-            </a:pPr>
-            <a:endParaRPr lang="en-US" dirty="0"/>
-          </a:p>
-          <a:p>
-            <a:pPr marL="0" indent="0">
-              <a:buNone/>
-            </a:pPr>
-            <a:r>
-              <a:rPr lang="en-US" dirty="0">
-                <a:solidFill>
-                  <a:srgbClr val="FF0000"/>
-                </a:solidFill>
-              </a:rPr>
-              <a:t>Clause.....ends&lt;choice&gt;&lt;sic&gt;&lt;/sic&gt;&lt;</a:t>
-            </a:r>
-            <a:r>
-              <a:rPr lang="en-US" dirty="0" err="1">
-                <a:solidFill>
-                  <a:srgbClr val="FF0000"/>
-                </a:solidFill>
-              </a:rPr>
-              <a:t>corr</a:t>
-            </a:r>
-            <a:r>
-              <a:rPr lang="en-US" dirty="0">
-                <a:solidFill>
-                  <a:srgbClr val="FF0000"/>
-                </a:solidFill>
-              </a:rPr>
-              <a:t>&gt;.&lt;</a:t>
-            </a:r>
-            <a:r>
-              <a:rPr lang="en-US" dirty="0" err="1">
-                <a:solidFill>
-                  <a:srgbClr val="FF0000"/>
-                </a:solidFill>
-              </a:rPr>
-              <a:t>corr</a:t>
-            </a:r>
-            <a:r>
-              <a:rPr lang="en-US" dirty="0">
-                <a:solidFill>
-                  <a:srgbClr val="FF0000"/>
-                </a:solidFill>
-              </a:rPr>
-              <a:t>&gt;&lt;/choice&gt;&lt;/cl&gt;&lt;cl&gt;New clause here...</a:t>
-            </a:r>
-            <a:endParaRPr lang="en-US" dirty="0" smtClean="0">
-              <a:solidFill>
-                <a:srgbClr val="FF0000"/>
-              </a:solidFill>
-            </a:endParaRPr>
-          </a:p>
-        </p:txBody>
-      </p:sp>
-    </p:spTree>
-    <p:extLst>
-      <p:ext uri="{BB962C8B-B14F-4D97-AF65-F5344CB8AC3E}">
-        <p14:creationId xmlns:p14="http://schemas.microsoft.com/office/powerpoint/2010/main" val="1138485794"/>
-      </p:ext>
-    </p:extLst>
-  </p:cSld>
-  <p:clrMapOvr>
-    <a:masterClrMapping/>
-  </p:clrMapOvr>
-  <p:timing>
-    <p:tnLst>
-      <p:par>
-        <p:cTn xmlns:p14="http://schemas.microsoft.com/office/powerpoint/2010/main" id="1" dur="indefinite" restart="never" nodeType="tmRoot"/>
-      </p:par>
-    </p:tnLst>
-  </p:timing>
-</p:sld>
-</file>
-
-<file path=ppt/slides/slide12.xml><?xml version="1.0" encoding="utf-8"?>
-<p:sld xmlns:a="http://schemas.openxmlformats.org/drawingml/2006/main" xmlns:r="http://schemas.openxmlformats.org/officeDocument/2006/relationships" xmlns:p="http://schemas.openxmlformats.org/presentationml/2006/main">
-  <p:cSld>
-    <p:spTree>
-      <p:nvGrpSpPr>
-        <p:cNvPr id="1" name=""/>
-        <p:cNvGrpSpPr/>
-        <p:nvPr/>
-      </p:nvGrpSpPr>
-      <p:grpSpPr>
-        <a:xfrm>
-          <a:off x="0" y="0"/>
-          <a:ext cx="0" cy="0"/>
-          <a:chOff x="0" y="0"/>
-          <a:chExt cx="0" cy="0"/>
-        </a:xfrm>
-      </p:grpSpPr>
-      <p:sp>
-        <p:nvSpPr>
-          <p:cNvPr id="2" name="Content Placeholder 1"/>
-          <p:cNvSpPr>
-            <a:spLocks noGrp="1"/>
-          </p:cNvSpPr>
-          <p:nvPr>
-            <p:ph idx="1"/>
-          </p:nvPr>
-        </p:nvSpPr>
-        <p:spPr>
-          <a:xfrm>
-            <a:off x="457200" y="1069383"/>
-            <a:ext cx="8500820" cy="5625885"/>
-          </a:xfrm>
-        </p:spPr>
-        <p:txBody>
-          <a:bodyPr>
-            <a:normAutofit fontScale="77500" lnSpcReduction="20000"/>
-          </a:bodyPr>
-          <a:lstStyle/>
-          <a:p>
-            <a:pPr marL="0" indent="0">
-              <a:buNone/>
-            </a:pPr>
-            <a:r>
-              <a:rPr lang="en-US" dirty="0">
-                <a:solidFill>
-                  <a:srgbClr val="005AB4"/>
-                </a:solidFill>
-              </a:rPr>
-              <a:t>&lt;</a:t>
-            </a:r>
-            <a:r>
-              <a:rPr lang="en-US" dirty="0" err="1">
-                <a:solidFill>
-                  <a:srgbClr val="005AB4"/>
-                </a:solidFill>
-              </a:rPr>
-              <a:t>xsl:template</a:t>
-            </a:r>
-            <a:r>
-              <a:rPr lang="en-US" dirty="0">
-                <a:solidFill>
-                  <a:srgbClr val="F5844C"/>
-                </a:solidFill>
-              </a:rPr>
-              <a:t> match</a:t>
-            </a:r>
-            <a:r>
-              <a:rPr lang="en-US" dirty="0">
-                <a:solidFill>
-                  <a:srgbClr val="FF8040"/>
-                </a:solidFill>
-              </a:rPr>
-              <a:t>=</a:t>
-            </a:r>
-            <a:r>
-              <a:rPr lang="en-US" dirty="0">
-                <a:solidFill>
-                  <a:srgbClr val="993300"/>
-                </a:solidFill>
-              </a:rPr>
-              <a:t>"cl[not(ancestor::argument)]"</a:t>
-            </a:r>
-            <a:r>
-              <a:rPr lang="en-US" dirty="0">
-                <a:solidFill>
-                  <a:srgbClr val="000096"/>
-                </a:solidFill>
-              </a:rPr>
-              <a:t>&gt;</a:t>
-            </a:r>
-            <a:r>
-              <a:rPr lang="en-US" dirty="0">
-                <a:solidFill>
-                  <a:srgbClr val="000000"/>
-                </a:solidFill>
-              </a:rPr>
-              <a:t/>
-            </a:r>
-            <a:br>
-              <a:rPr lang="en-US" dirty="0">
-                <a:solidFill>
-                  <a:srgbClr val="000000"/>
-                </a:solidFill>
-              </a:rPr>
-            </a:br>
-            <a:r>
-              <a:rPr lang="en-US" dirty="0">
-                <a:solidFill>
-                  <a:srgbClr val="000000"/>
-                </a:solidFill>
-              </a:rPr>
-              <a:t>        </a:t>
-            </a:r>
-            <a:r>
-              <a:rPr lang="en-US" dirty="0">
-                <a:solidFill>
-                  <a:srgbClr val="000096"/>
-                </a:solidFill>
-              </a:rPr>
-              <a:t>&lt;cl&gt;</a:t>
-            </a:r>
-            <a:r>
-              <a:rPr lang="en-US" dirty="0">
-                <a:solidFill>
-                  <a:srgbClr val="000000"/>
-                </a:solidFill>
-              </a:rPr>
-              <a:t/>
-            </a:r>
-            <a:br>
-              <a:rPr lang="en-US" dirty="0">
-                <a:solidFill>
-                  <a:srgbClr val="000000"/>
-                </a:solidFill>
-              </a:rPr>
-            </a:br>
-            <a:r>
-              <a:rPr lang="en-US" dirty="0">
-                <a:solidFill>
-                  <a:srgbClr val="000000"/>
-                </a:solidFill>
-              </a:rPr>
-              <a:t>            </a:t>
-            </a:r>
-            <a:r>
-              <a:rPr lang="en-US" dirty="0">
-                <a:solidFill>
-                  <a:srgbClr val="005AB4"/>
-                </a:solidFill>
-              </a:rPr>
-              <a:t>&lt;</a:t>
-            </a:r>
-            <a:r>
-              <a:rPr lang="en-US" dirty="0" err="1">
-                <a:solidFill>
-                  <a:srgbClr val="005AB4"/>
-                </a:solidFill>
-              </a:rPr>
-              <a:t>xsl:attribute</a:t>
-            </a:r>
-            <a:r>
-              <a:rPr lang="en-US" dirty="0">
-                <a:solidFill>
-                  <a:srgbClr val="F5844C"/>
-                </a:solidFill>
-              </a:rPr>
-              <a:t> name</a:t>
-            </a:r>
-            <a:r>
-              <a:rPr lang="en-US" dirty="0">
-                <a:solidFill>
-                  <a:srgbClr val="FF8040"/>
-                </a:solidFill>
-              </a:rPr>
-              <a:t>=</a:t>
-            </a:r>
-            <a:r>
-              <a:rPr lang="en-US" dirty="0">
-                <a:solidFill>
-                  <a:srgbClr val="993300"/>
-                </a:solidFill>
-              </a:rPr>
-              <a:t>"</a:t>
-            </a:r>
-            <a:r>
-              <a:rPr lang="en-US" dirty="0" err="1">
-                <a:solidFill>
-                  <a:srgbClr val="993300"/>
-                </a:solidFill>
-              </a:rPr>
-              <a:t>xml:id</a:t>
-            </a:r>
-            <a:r>
-              <a:rPr lang="en-US" dirty="0">
-                <a:solidFill>
-                  <a:srgbClr val="993300"/>
-                </a:solidFill>
-              </a:rPr>
-              <a:t>"</a:t>
-            </a:r>
-            <a:r>
-              <a:rPr lang="en-US" dirty="0">
-                <a:solidFill>
-                  <a:srgbClr val="000096"/>
-                </a:solidFill>
-              </a:rPr>
-              <a:t>&gt;</a:t>
-            </a:r>
-            <a:r>
-              <a:rPr lang="en-US" dirty="0">
-                <a:solidFill>
-                  <a:srgbClr val="000000"/>
-                </a:solidFill>
-              </a:rPr>
-              <a:t/>
-            </a:r>
-            <a:br>
-              <a:rPr lang="en-US" dirty="0">
-                <a:solidFill>
-                  <a:srgbClr val="000000"/>
-                </a:solidFill>
-              </a:rPr>
-            </a:br>
-            <a:r>
-              <a:rPr lang="en-US" dirty="0">
-                <a:solidFill>
-                  <a:srgbClr val="000000"/>
-                </a:solidFill>
-              </a:rPr>
-              <a:t>                </a:t>
-            </a:r>
-            <a:r>
-              <a:rPr lang="en-US" dirty="0">
-                <a:solidFill>
-                  <a:srgbClr val="005AB4"/>
-                </a:solidFill>
-              </a:rPr>
-              <a:t>&lt;</a:t>
-            </a:r>
-            <a:r>
-              <a:rPr lang="en-US" dirty="0" err="1">
-                <a:solidFill>
-                  <a:srgbClr val="005AB4"/>
-                </a:solidFill>
-              </a:rPr>
-              <a:t>xsl:value-of</a:t>
-            </a:r>
-            <a:r>
-              <a:rPr lang="en-US" dirty="0">
-                <a:solidFill>
-                  <a:srgbClr val="F5844C"/>
-                </a:solidFill>
-              </a:rPr>
-              <a:t> select</a:t>
-            </a:r>
-            <a:r>
-              <a:rPr lang="en-US" dirty="0">
-                <a:solidFill>
-                  <a:srgbClr val="FF8040"/>
-                </a:solidFill>
-              </a:rPr>
-              <a:t>=</a:t>
-            </a:r>
-            <a:r>
-              <a:rPr lang="en-US" dirty="0">
-                <a:solidFill>
-                  <a:srgbClr val="993300"/>
-                </a:solidFill>
-              </a:rPr>
-              <a:t>"./ancestor::div[@type='chapter']/@</a:t>
-            </a:r>
-            <a:r>
-              <a:rPr lang="en-US" dirty="0" err="1">
-                <a:solidFill>
-                  <a:srgbClr val="993300"/>
-                </a:solidFill>
-              </a:rPr>
-              <a:t>xml:id</a:t>
-            </a:r>
-            <a:r>
-              <a:rPr lang="en-US" dirty="0">
-                <a:solidFill>
-                  <a:srgbClr val="993300"/>
-                </a:solidFill>
-              </a:rPr>
-              <a:t>"</a:t>
-            </a:r>
-            <a:r>
-              <a:rPr lang="en-US" dirty="0">
-                <a:solidFill>
-                  <a:srgbClr val="000096"/>
-                </a:solidFill>
-              </a:rPr>
-              <a:t>/&gt;</a:t>
-            </a:r>
-            <a:r>
-              <a:rPr lang="en-US" dirty="0">
-                <a:solidFill>
-                  <a:srgbClr val="000000"/>
-                </a:solidFill>
-              </a:rPr>
-              <a:t/>
-            </a:r>
-            <a:br>
-              <a:rPr lang="en-US" dirty="0">
-                <a:solidFill>
-                  <a:srgbClr val="000000"/>
-                </a:solidFill>
-              </a:rPr>
-            </a:br>
-            <a:r>
-              <a:rPr lang="en-US" dirty="0">
-                <a:solidFill>
-                  <a:srgbClr val="000000"/>
-                </a:solidFill>
-              </a:rPr>
-              <a:t>               </a:t>
-            </a:r>
-            <a:br>
-              <a:rPr lang="en-US" dirty="0">
-                <a:solidFill>
-                  <a:srgbClr val="000000"/>
-                </a:solidFill>
-              </a:rPr>
-            </a:br>
-            <a:r>
-              <a:rPr lang="en-US" dirty="0">
-                <a:solidFill>
-                  <a:srgbClr val="000000"/>
-                </a:solidFill>
-              </a:rPr>
-              <a:t>                </a:t>
-            </a:r>
-            <a:r>
-              <a:rPr lang="en-US" dirty="0">
-                <a:solidFill>
-                  <a:srgbClr val="005AB4"/>
-                </a:solidFill>
-              </a:rPr>
-              <a:t>&lt;</a:t>
-            </a:r>
-            <a:r>
-              <a:rPr lang="en-US" dirty="0" err="1">
-                <a:solidFill>
-                  <a:srgbClr val="005AB4"/>
-                </a:solidFill>
-              </a:rPr>
-              <a:t>xsl:if</a:t>
-            </a:r>
-            <a:r>
-              <a:rPr lang="en-US" dirty="0">
-                <a:solidFill>
-                  <a:srgbClr val="F5844C"/>
-                </a:solidFill>
-              </a:rPr>
-              <a:t> test</a:t>
-            </a:r>
-            <a:r>
-              <a:rPr lang="en-US" dirty="0">
-                <a:solidFill>
-                  <a:srgbClr val="FF8040"/>
-                </a:solidFill>
-              </a:rPr>
-              <a:t>=</a:t>
-            </a:r>
-            <a:r>
-              <a:rPr lang="en-US" dirty="0">
-                <a:solidFill>
-                  <a:srgbClr val="993300"/>
-                </a:solidFill>
-              </a:rPr>
-              <a:t>"./ancestor::</a:t>
-            </a:r>
-            <a:r>
-              <a:rPr lang="en-US" dirty="0" err="1">
-                <a:solidFill>
-                  <a:srgbClr val="993300"/>
-                </a:solidFill>
-              </a:rPr>
-              <a:t>floatingText</a:t>
-            </a:r>
-            <a:r>
-              <a:rPr lang="en-US" dirty="0">
-                <a:solidFill>
-                  <a:srgbClr val="993300"/>
-                </a:solidFill>
-              </a:rPr>
-              <a:t>"</a:t>
-            </a:r>
-            <a:r>
-              <a:rPr lang="en-US" dirty="0">
-                <a:solidFill>
-                  <a:srgbClr val="000096"/>
-                </a:solidFill>
-              </a:rPr>
-              <a:t>&gt;</a:t>
-            </a:r>
-            <a:r>
-              <a:rPr lang="en-US" dirty="0">
-                <a:solidFill>
-                  <a:srgbClr val="000000"/>
-                </a:solidFill>
-              </a:rPr>
-              <a:t/>
-            </a:r>
-            <a:br>
-              <a:rPr lang="en-US" dirty="0">
-                <a:solidFill>
-                  <a:srgbClr val="000000"/>
-                </a:solidFill>
-              </a:rPr>
-            </a:br>
-            <a:r>
-              <a:rPr lang="en-US" dirty="0">
-                <a:solidFill>
-                  <a:srgbClr val="000000"/>
-                </a:solidFill>
-              </a:rPr>
-              <a:t>                    </a:t>
-            </a:r>
-            <a:r>
-              <a:rPr lang="en-US" dirty="0">
-                <a:solidFill>
-                  <a:srgbClr val="005AB4"/>
-                </a:solidFill>
-              </a:rPr>
-              <a:t>&lt;</a:t>
-            </a:r>
-            <a:r>
-              <a:rPr lang="en-US" dirty="0" err="1">
-                <a:solidFill>
-                  <a:srgbClr val="005AB4"/>
-                </a:solidFill>
-              </a:rPr>
-              <a:t>xsl:text</a:t>
-            </a:r>
-            <a:r>
-              <a:rPr lang="en-US" dirty="0">
-                <a:solidFill>
-                  <a:srgbClr val="005AB4"/>
-                </a:solidFill>
-              </a:rPr>
-              <a:t>&gt;</a:t>
-            </a:r>
-            <a:r>
-              <a:rPr lang="en-US" dirty="0">
-                <a:solidFill>
-                  <a:srgbClr val="000000"/>
-                </a:solidFill>
-              </a:rPr>
-              <a:t>_</a:t>
-            </a:r>
-            <a:r>
-              <a:rPr lang="en-US" dirty="0" err="1">
-                <a:solidFill>
-                  <a:srgbClr val="000000"/>
-                </a:solidFill>
-              </a:rPr>
-              <a:t>ft</a:t>
-            </a:r>
-            <a:r>
-              <a:rPr lang="en-US" dirty="0">
-                <a:solidFill>
-                  <a:srgbClr val="005AB4"/>
-                </a:solidFill>
-              </a:rPr>
-              <a:t>&lt;/</a:t>
-            </a:r>
-            <a:r>
-              <a:rPr lang="en-US" dirty="0" err="1">
-                <a:solidFill>
-                  <a:srgbClr val="005AB4"/>
-                </a:solidFill>
-              </a:rPr>
-              <a:t>xsl:text</a:t>
-            </a:r>
-            <a:r>
-              <a:rPr lang="en-US" dirty="0">
-                <a:solidFill>
-                  <a:srgbClr val="005AB4"/>
-                </a:solidFill>
-              </a:rPr>
-              <a:t>&gt;</a:t>
-            </a:r>
-            <a:r>
-              <a:rPr lang="en-US" dirty="0">
-                <a:solidFill>
-                  <a:srgbClr val="000000"/>
-                </a:solidFill>
-              </a:rPr>
-              <a:t/>
-            </a:r>
-            <a:br>
-              <a:rPr lang="en-US" dirty="0">
-                <a:solidFill>
-                  <a:srgbClr val="000000"/>
-                </a:solidFill>
-              </a:rPr>
-            </a:br>
-            <a:r>
-              <a:rPr lang="en-US" dirty="0">
-                <a:solidFill>
-                  <a:srgbClr val="000000"/>
-                </a:solidFill>
-              </a:rPr>
-              <a:t>                    </a:t>
-            </a:r>
-            <a:r>
-              <a:rPr lang="en-US" dirty="0">
-                <a:solidFill>
-                  <a:srgbClr val="005AB4"/>
-                </a:solidFill>
-              </a:rPr>
-              <a:t>&lt;</a:t>
-            </a:r>
-            <a:r>
-              <a:rPr lang="en-US" dirty="0" err="1">
-                <a:solidFill>
-                  <a:srgbClr val="005AB4"/>
-                </a:solidFill>
-              </a:rPr>
-              <a:t>xsl:number</a:t>
-            </a:r>
-            <a:r>
-              <a:rPr lang="en-US" dirty="0">
-                <a:solidFill>
-                  <a:srgbClr val="F5844C"/>
-                </a:solidFill>
-              </a:rPr>
-              <a:t> select</a:t>
-            </a:r>
-            <a:r>
-              <a:rPr lang="en-US" dirty="0">
-                <a:solidFill>
-                  <a:srgbClr val="FF8040"/>
-                </a:solidFill>
-              </a:rPr>
-              <a:t>=</a:t>
-            </a:r>
-            <a:r>
-              <a:rPr lang="en-US" dirty="0">
-                <a:solidFill>
-                  <a:srgbClr val="993300"/>
-                </a:solidFill>
-              </a:rPr>
-              <a:t>"./ancestor::</a:t>
-            </a:r>
-            <a:r>
-              <a:rPr lang="en-US" dirty="0" err="1">
-                <a:solidFill>
-                  <a:srgbClr val="993300"/>
-                </a:solidFill>
-              </a:rPr>
-              <a:t>floatingText</a:t>
-            </a:r>
-            <a:r>
-              <a:rPr lang="en-US" dirty="0">
-                <a:solidFill>
-                  <a:srgbClr val="993300"/>
-                </a:solidFill>
-              </a:rPr>
-              <a:t>[1]"</a:t>
-            </a:r>
-            <a:r>
-              <a:rPr lang="en-US" dirty="0">
-                <a:solidFill>
-                  <a:srgbClr val="F5844C"/>
-                </a:solidFill>
-              </a:rPr>
-              <a:t> level</a:t>
-            </a:r>
-            <a:r>
-              <a:rPr lang="en-US" dirty="0">
-                <a:solidFill>
-                  <a:srgbClr val="FF8040"/>
-                </a:solidFill>
-              </a:rPr>
-              <a:t>=</a:t>
-            </a:r>
-            <a:r>
-              <a:rPr lang="en-US" dirty="0">
-                <a:solidFill>
-                  <a:srgbClr val="993300"/>
-                </a:solidFill>
-              </a:rPr>
-              <a:t>"any"</a:t>
-            </a:r>
-            <a:r>
-              <a:rPr lang="en-US" dirty="0">
-                <a:solidFill>
-                  <a:srgbClr val="000096"/>
-                </a:solidFill>
-              </a:rPr>
-              <a:t>/&gt;</a:t>
-            </a:r>
-            <a:r>
-              <a:rPr lang="en-US" dirty="0">
-                <a:solidFill>
-                  <a:srgbClr val="000000"/>
-                </a:solidFill>
-              </a:rPr>
-              <a:t/>
-            </a:r>
-            <a:br>
-              <a:rPr lang="en-US" dirty="0">
-                <a:solidFill>
-                  <a:srgbClr val="000000"/>
-                </a:solidFill>
-              </a:rPr>
-            </a:br>
-            <a:r>
-              <a:rPr lang="en-US" dirty="0">
-                <a:solidFill>
-                  <a:srgbClr val="000000"/>
-                </a:solidFill>
-              </a:rPr>
-              <a:t>                </a:t>
-            </a:r>
-            <a:r>
-              <a:rPr lang="en-US" dirty="0">
-                <a:solidFill>
-                  <a:srgbClr val="005AB4"/>
-                </a:solidFill>
-              </a:rPr>
-              <a:t>&lt;/</a:t>
-            </a:r>
-            <a:r>
-              <a:rPr lang="en-US" dirty="0" err="1">
-                <a:solidFill>
-                  <a:srgbClr val="005AB4"/>
-                </a:solidFill>
-              </a:rPr>
-              <a:t>xsl:if</a:t>
-            </a:r>
-            <a:r>
-              <a:rPr lang="en-US" dirty="0">
-                <a:solidFill>
-                  <a:srgbClr val="005AB4"/>
-                </a:solidFill>
-              </a:rPr>
-              <a:t>&gt;</a:t>
-            </a:r>
-            <a:r>
-              <a:rPr lang="en-US" dirty="0">
-                <a:solidFill>
-                  <a:srgbClr val="000000"/>
-                </a:solidFill>
-              </a:rPr>
-              <a:t/>
-            </a:r>
-            <a:br>
-              <a:rPr lang="en-US" dirty="0">
-                <a:solidFill>
-                  <a:srgbClr val="000000"/>
-                </a:solidFill>
-              </a:rPr>
-            </a:br>
-            <a:r>
-              <a:rPr lang="en-US" dirty="0">
-                <a:solidFill>
-                  <a:srgbClr val="000000"/>
-                </a:solidFill>
-              </a:rPr>
-              <a:t>                </a:t>
-            </a:r>
-            <a:r>
-              <a:rPr lang="en-US" dirty="0">
-                <a:solidFill>
-                  <a:srgbClr val="005AB4"/>
-                </a:solidFill>
-              </a:rPr>
-              <a:t>&lt;</a:t>
-            </a:r>
-            <a:r>
-              <a:rPr lang="en-US" dirty="0" err="1">
-                <a:solidFill>
-                  <a:srgbClr val="005AB4"/>
-                </a:solidFill>
-              </a:rPr>
-              <a:t>xsl:text</a:t>
-            </a:r>
-            <a:r>
-              <a:rPr lang="en-US" dirty="0">
-                <a:solidFill>
-                  <a:srgbClr val="005AB4"/>
-                </a:solidFill>
-              </a:rPr>
-              <a:t>&gt;</a:t>
-            </a:r>
-            <a:r>
-              <a:rPr lang="en-US" dirty="0">
-                <a:solidFill>
-                  <a:srgbClr val="000000"/>
-                </a:solidFill>
-              </a:rPr>
-              <a:t>_</a:t>
-            </a:r>
-            <a:r>
-              <a:rPr lang="en-US" dirty="0">
-                <a:solidFill>
-                  <a:srgbClr val="005AB4"/>
-                </a:solidFill>
-              </a:rPr>
-              <a:t>&lt;/</a:t>
-            </a:r>
-            <a:r>
-              <a:rPr lang="en-US" dirty="0" err="1">
-                <a:solidFill>
-                  <a:srgbClr val="005AB4"/>
-                </a:solidFill>
-              </a:rPr>
-              <a:t>xsl:text</a:t>
-            </a:r>
-            <a:r>
-              <a:rPr lang="en-US" dirty="0">
-                <a:solidFill>
-                  <a:srgbClr val="005AB4"/>
-                </a:solidFill>
-              </a:rPr>
-              <a:t>&gt;</a:t>
-            </a:r>
-            <a:r>
-              <a:rPr lang="en-US" dirty="0">
-                <a:solidFill>
-                  <a:srgbClr val="000000"/>
-                </a:solidFill>
-              </a:rPr>
-              <a:t/>
-            </a:r>
-            <a:br>
-              <a:rPr lang="en-US" dirty="0">
-                <a:solidFill>
-                  <a:srgbClr val="000000"/>
-                </a:solidFill>
-              </a:rPr>
-            </a:br>
-            <a:r>
-              <a:rPr lang="en-US" dirty="0">
-                <a:solidFill>
-                  <a:srgbClr val="000000"/>
-                </a:solidFill>
-              </a:rPr>
-              <a:t>                </a:t>
-            </a:r>
-            <a:r>
-              <a:rPr lang="en-US" dirty="0">
-                <a:solidFill>
-                  <a:srgbClr val="005AB4"/>
-                </a:solidFill>
-              </a:rPr>
-              <a:t>&lt;</a:t>
-            </a:r>
-            <a:r>
-              <a:rPr lang="en-US" dirty="0" err="1">
-                <a:solidFill>
-                  <a:srgbClr val="005AB4"/>
-                </a:solidFill>
-              </a:rPr>
-              <a:t>xsl:value-of</a:t>
-            </a:r>
-            <a:r>
-              <a:rPr lang="en-US" dirty="0">
-                <a:solidFill>
-                  <a:srgbClr val="F5844C"/>
-                </a:solidFill>
-              </a:rPr>
-              <a:t> select</a:t>
-            </a:r>
-            <a:r>
-              <a:rPr lang="en-US" dirty="0">
-                <a:solidFill>
-                  <a:srgbClr val="FF8040"/>
-                </a:solidFill>
-              </a:rPr>
-              <a:t>=</a:t>
-            </a:r>
-            <a:r>
-              <a:rPr lang="en-US" dirty="0">
-                <a:solidFill>
-                  <a:srgbClr val="993300"/>
-                </a:solidFill>
-              </a:rPr>
-              <a:t>"./parent::*/name()"</a:t>
-            </a:r>
-            <a:r>
-              <a:rPr lang="en-US" dirty="0">
-                <a:solidFill>
-                  <a:srgbClr val="000096"/>
-                </a:solidFill>
-              </a:rPr>
-              <a:t>/&gt;</a:t>
-            </a:r>
-            <a:r>
-              <a:rPr lang="en-US" dirty="0">
-                <a:solidFill>
-                  <a:srgbClr val="000000"/>
-                </a:solidFill>
-              </a:rPr>
-              <a:t/>
-            </a:r>
-            <a:br>
-              <a:rPr lang="en-US" dirty="0">
-                <a:solidFill>
-                  <a:srgbClr val="000000"/>
-                </a:solidFill>
-              </a:rPr>
-            </a:br>
-            <a:r>
-              <a:rPr lang="en-US" dirty="0">
-                <a:solidFill>
-                  <a:srgbClr val="000000"/>
-                </a:solidFill>
-              </a:rPr>
-              <a:t>                </a:t>
-            </a:r>
-            <a:br>
-              <a:rPr lang="en-US" dirty="0">
-                <a:solidFill>
-                  <a:srgbClr val="000000"/>
-                </a:solidFill>
-              </a:rPr>
-            </a:br>
-            <a:r>
-              <a:rPr lang="en-US" dirty="0">
-                <a:solidFill>
-                  <a:srgbClr val="000000"/>
-                </a:solidFill>
-              </a:rPr>
-              <a:t>                </a:t>
-            </a:r>
-            <a:r>
-              <a:rPr lang="en-US" dirty="0">
-                <a:solidFill>
-                  <a:srgbClr val="005AB4"/>
-                </a:solidFill>
-              </a:rPr>
-              <a:t>&lt;</a:t>
-            </a:r>
-            <a:r>
-              <a:rPr lang="en-US" dirty="0" err="1">
-                <a:solidFill>
-                  <a:srgbClr val="005AB4"/>
-                </a:solidFill>
-              </a:rPr>
-              <a:t>xsl:number</a:t>
-            </a:r>
-            <a:r>
-              <a:rPr lang="en-US" dirty="0">
-                <a:solidFill>
-                  <a:srgbClr val="F5844C"/>
-                </a:solidFill>
-              </a:rPr>
-              <a:t> select</a:t>
-            </a:r>
-            <a:r>
-              <a:rPr lang="en-US" dirty="0">
-                <a:solidFill>
-                  <a:srgbClr val="FF8040"/>
-                </a:solidFill>
-              </a:rPr>
-              <a:t>=</a:t>
-            </a:r>
-            <a:r>
-              <a:rPr lang="en-US" dirty="0">
-                <a:solidFill>
-                  <a:srgbClr val="993300"/>
-                </a:solidFill>
-              </a:rPr>
-              <a:t>"./parent::*"</a:t>
-            </a:r>
-            <a:r>
-              <a:rPr lang="en-US" dirty="0">
-                <a:solidFill>
-                  <a:srgbClr val="F5844C"/>
-                </a:solidFill>
-              </a:rPr>
-              <a:t> level</a:t>
-            </a:r>
-            <a:r>
-              <a:rPr lang="en-US" dirty="0">
-                <a:solidFill>
-                  <a:srgbClr val="FF8040"/>
-                </a:solidFill>
-              </a:rPr>
-              <a:t>=</a:t>
-            </a:r>
-            <a:r>
-              <a:rPr lang="en-US" dirty="0">
-                <a:solidFill>
-                  <a:srgbClr val="993300"/>
-                </a:solidFill>
-              </a:rPr>
-              <a:t>"any"</a:t>
-            </a:r>
-            <a:r>
-              <a:rPr lang="en-US" dirty="0">
-                <a:solidFill>
-                  <a:srgbClr val="F5844C"/>
-                </a:solidFill>
-              </a:rPr>
-              <a:t> count</a:t>
-            </a:r>
-            <a:r>
-              <a:rPr lang="en-US" dirty="0">
-                <a:solidFill>
-                  <a:srgbClr val="FF8040"/>
-                </a:solidFill>
-              </a:rPr>
-              <a:t>=</a:t>
-            </a:r>
-            <a:r>
-              <a:rPr lang="en-US" dirty="0">
-                <a:solidFill>
-                  <a:srgbClr val="993300"/>
-                </a:solidFill>
-              </a:rPr>
-              <a:t>"//div[@type='chapter']//p[not(parent::argument)]"</a:t>
-            </a:r>
-            <a:r>
-              <a:rPr lang="en-US" dirty="0">
-                <a:solidFill>
-                  <a:srgbClr val="000096"/>
-                </a:solidFill>
-              </a:rPr>
-              <a:t>/&gt;</a:t>
-            </a:r>
-            <a:r>
-              <a:rPr lang="en-US" dirty="0">
-                <a:solidFill>
-                  <a:srgbClr val="000000"/>
-                </a:solidFill>
-              </a:rPr>
-              <a:t/>
-            </a:r>
-            <a:br>
-              <a:rPr lang="en-US" dirty="0">
-                <a:solidFill>
-                  <a:srgbClr val="000000"/>
-                </a:solidFill>
-              </a:rPr>
-            </a:br>
-            <a:r>
-              <a:rPr lang="en-US" dirty="0">
-                <a:solidFill>
-                  <a:srgbClr val="000000"/>
-                </a:solidFill>
-              </a:rPr>
-              <a:t>                              </a:t>
-            </a:r>
-            <a:br>
-              <a:rPr lang="en-US" dirty="0">
-                <a:solidFill>
-                  <a:srgbClr val="000000"/>
-                </a:solidFill>
-              </a:rPr>
-            </a:br>
-            <a:r>
-              <a:rPr lang="en-US" dirty="0">
-                <a:solidFill>
-                  <a:srgbClr val="000000"/>
-                </a:solidFill>
-              </a:rPr>
-              <a:t>                </a:t>
-            </a:r>
-            <a:r>
-              <a:rPr lang="en-US" dirty="0">
-                <a:solidFill>
-                  <a:srgbClr val="005AB4"/>
-                </a:solidFill>
-              </a:rPr>
-              <a:t>&lt;</a:t>
-            </a:r>
-            <a:r>
-              <a:rPr lang="en-US" dirty="0" err="1">
-                <a:solidFill>
-                  <a:srgbClr val="005AB4"/>
-                </a:solidFill>
-              </a:rPr>
-              <a:t>xsl:text</a:t>
-            </a:r>
-            <a:r>
-              <a:rPr lang="en-US" dirty="0">
-                <a:solidFill>
-                  <a:srgbClr val="005AB4"/>
-                </a:solidFill>
-              </a:rPr>
-              <a:t>&gt;</a:t>
-            </a:r>
-            <a:r>
-              <a:rPr lang="en-US" dirty="0">
-                <a:solidFill>
-                  <a:srgbClr val="000000"/>
-                </a:solidFill>
-              </a:rPr>
-              <a:t>_c</a:t>
-            </a:r>
-            <a:r>
-              <a:rPr lang="en-US" dirty="0">
-                <a:solidFill>
-                  <a:srgbClr val="005AB4"/>
-                </a:solidFill>
-              </a:rPr>
-              <a:t>&lt;/</a:t>
-            </a:r>
-            <a:r>
-              <a:rPr lang="en-US" dirty="0" err="1">
-                <a:solidFill>
-                  <a:srgbClr val="005AB4"/>
-                </a:solidFill>
-              </a:rPr>
-              <a:t>xsl:text</a:t>
-            </a:r>
-            <a:r>
-              <a:rPr lang="en-US" dirty="0">
-                <a:solidFill>
-                  <a:srgbClr val="005AB4"/>
-                </a:solidFill>
-              </a:rPr>
-              <a:t>&gt;</a:t>
-            </a:r>
-            <a:r>
-              <a:rPr lang="en-US" dirty="0">
-                <a:solidFill>
-                  <a:srgbClr val="000000"/>
-                </a:solidFill>
-              </a:rPr>
-              <a:t/>
-            </a:r>
-            <a:br>
-              <a:rPr lang="en-US" dirty="0">
-                <a:solidFill>
-                  <a:srgbClr val="000000"/>
-                </a:solidFill>
-              </a:rPr>
-            </a:br>
-            <a:r>
-              <a:rPr lang="en-US" dirty="0">
-                <a:solidFill>
-                  <a:srgbClr val="000000"/>
-                </a:solidFill>
-              </a:rPr>
-              <a:t>                </a:t>
-            </a:r>
-            <a:r>
-              <a:rPr lang="en-US" dirty="0">
-                <a:solidFill>
-                  <a:srgbClr val="005AB4"/>
-                </a:solidFill>
-              </a:rPr>
-              <a:t>&lt;</a:t>
-            </a:r>
-            <a:r>
-              <a:rPr lang="en-US" dirty="0" err="1">
-                <a:solidFill>
-                  <a:srgbClr val="005AB4"/>
-                </a:solidFill>
-              </a:rPr>
-              <a:t>xsl:number</a:t>
-            </a:r>
-            <a:r>
-              <a:rPr lang="en-US" dirty="0">
-                <a:solidFill>
-                  <a:srgbClr val="F5844C"/>
-                </a:solidFill>
-              </a:rPr>
-              <a:t> level</a:t>
-            </a:r>
-            <a:r>
-              <a:rPr lang="en-US" dirty="0">
-                <a:solidFill>
-                  <a:srgbClr val="FF8040"/>
-                </a:solidFill>
-              </a:rPr>
-              <a:t>=</a:t>
-            </a:r>
-            <a:r>
-              <a:rPr lang="en-US" dirty="0">
-                <a:solidFill>
-                  <a:srgbClr val="993300"/>
-                </a:solidFill>
-              </a:rPr>
-              <a:t>"any"</a:t>
-            </a:r>
-            <a:r>
-              <a:rPr lang="en-US" dirty="0">
-                <a:solidFill>
-                  <a:srgbClr val="F5844C"/>
-                </a:solidFill>
-              </a:rPr>
-              <a:t> count</a:t>
-            </a:r>
-            <a:r>
-              <a:rPr lang="en-US" dirty="0">
-                <a:solidFill>
-                  <a:srgbClr val="FF8040"/>
-                </a:solidFill>
-              </a:rPr>
-              <a:t>=</a:t>
-            </a:r>
-            <a:r>
-              <a:rPr lang="en-US" dirty="0">
-                <a:solidFill>
-                  <a:srgbClr val="993300"/>
-                </a:solidFill>
-              </a:rPr>
-              <a:t>"//div[@type='chapter']//cl[not(ancestor::argument)]"</a:t>
-            </a:r>
-            <a:r>
-              <a:rPr lang="en-US" dirty="0">
-                <a:solidFill>
-                  <a:srgbClr val="000096"/>
-                </a:solidFill>
-              </a:rPr>
-              <a:t>/&gt;</a:t>
-            </a:r>
-            <a:r>
-              <a:rPr lang="en-US" dirty="0">
-                <a:solidFill>
-                  <a:srgbClr val="000000"/>
-                </a:solidFill>
-              </a:rPr>
-              <a:t/>
-            </a:r>
-            <a:br>
-              <a:rPr lang="en-US" dirty="0">
-                <a:solidFill>
-                  <a:srgbClr val="000000"/>
-                </a:solidFill>
-              </a:rPr>
-            </a:br>
-            <a:r>
-              <a:rPr lang="en-US" dirty="0">
-                <a:solidFill>
-                  <a:srgbClr val="000000"/>
-                </a:solidFill>
-              </a:rPr>
-              <a:t>            </a:t>
-            </a:r>
-            <a:r>
-              <a:rPr lang="en-US" dirty="0">
-                <a:solidFill>
-                  <a:srgbClr val="005AB4"/>
-                </a:solidFill>
-              </a:rPr>
-              <a:t>&lt;/</a:t>
-            </a:r>
-            <a:r>
-              <a:rPr lang="en-US" dirty="0" err="1">
-                <a:solidFill>
-                  <a:srgbClr val="005AB4"/>
-                </a:solidFill>
-              </a:rPr>
-              <a:t>xsl:attribute</a:t>
-            </a:r>
-            <a:r>
-              <a:rPr lang="en-US" dirty="0">
-                <a:solidFill>
-                  <a:srgbClr val="005AB4"/>
-                </a:solidFill>
-              </a:rPr>
-              <a:t>&gt;</a:t>
-            </a:r>
-            <a:r>
-              <a:rPr lang="en-US" dirty="0">
-                <a:solidFill>
-                  <a:srgbClr val="000000"/>
-                </a:solidFill>
-              </a:rPr>
-              <a:t/>
-            </a:r>
-            <a:br>
-              <a:rPr lang="en-US" dirty="0">
-                <a:solidFill>
-                  <a:srgbClr val="000000"/>
-                </a:solidFill>
-              </a:rPr>
-            </a:br>
-            <a:r>
-              <a:rPr lang="en-US" dirty="0">
-                <a:solidFill>
-                  <a:srgbClr val="000000"/>
-                </a:solidFill>
-              </a:rPr>
-              <a:t/>
-            </a:r>
-            <a:br>
-              <a:rPr lang="en-US" dirty="0">
-                <a:solidFill>
-                  <a:srgbClr val="000000"/>
-                </a:solidFill>
-              </a:rPr>
-            </a:br>
-            <a:r>
-              <a:rPr lang="en-US" dirty="0">
-                <a:solidFill>
-                  <a:srgbClr val="000000"/>
-                </a:solidFill>
-              </a:rPr>
-              <a:t>            </a:t>
-            </a:r>
-            <a:r>
-              <a:rPr lang="en-US" dirty="0">
-                <a:solidFill>
-                  <a:srgbClr val="005AB4"/>
-                </a:solidFill>
-              </a:rPr>
-              <a:t>&lt;</a:t>
-            </a:r>
-            <a:r>
-              <a:rPr lang="en-US" dirty="0" err="1">
-                <a:solidFill>
-                  <a:srgbClr val="005AB4"/>
-                </a:solidFill>
-              </a:rPr>
-              <a:t>xsl:apply-templates</a:t>
-            </a:r>
-            <a:r>
-              <a:rPr lang="en-US" dirty="0">
-                <a:solidFill>
-                  <a:srgbClr val="005AB4"/>
-                </a:solidFill>
-              </a:rPr>
-              <a:t>/&gt;</a:t>
-            </a:r>
-            <a:r>
-              <a:rPr lang="en-US" dirty="0">
-                <a:solidFill>
-                  <a:srgbClr val="000000"/>
-                </a:solidFill>
-              </a:rPr>
-              <a:t/>
-            </a:r>
-            <a:br>
-              <a:rPr lang="en-US" dirty="0">
-                <a:solidFill>
-                  <a:srgbClr val="000000"/>
-                </a:solidFill>
-              </a:rPr>
-            </a:br>
-            <a:r>
-              <a:rPr lang="en-US" dirty="0">
-                <a:solidFill>
-                  <a:srgbClr val="000000"/>
-                </a:solidFill>
-              </a:rPr>
-              <a:t>        </a:t>
-            </a:r>
-            <a:r>
-              <a:rPr lang="en-US" dirty="0">
-                <a:solidFill>
-                  <a:srgbClr val="000096"/>
-                </a:solidFill>
-              </a:rPr>
-              <a:t>&lt;/cl&gt;</a:t>
-            </a:r>
-            <a:r>
-              <a:rPr lang="en-US" dirty="0">
-                <a:solidFill>
-                  <a:srgbClr val="000000"/>
-                </a:solidFill>
-              </a:rPr>
-              <a:t/>
-            </a:r>
-            <a:br>
-              <a:rPr lang="en-US" dirty="0">
-                <a:solidFill>
-                  <a:srgbClr val="000000"/>
-                </a:solidFill>
-              </a:rPr>
-            </a:br>
-            <a:r>
-              <a:rPr lang="en-US" dirty="0">
-                <a:solidFill>
-                  <a:srgbClr val="000000"/>
-                </a:solidFill>
-              </a:rPr>
-              <a:t>    </a:t>
-            </a:r>
-            <a:r>
-              <a:rPr lang="en-US" dirty="0">
-                <a:solidFill>
-                  <a:srgbClr val="005AB4"/>
-                </a:solidFill>
-              </a:rPr>
-              <a:t>&lt;/</a:t>
-            </a:r>
-            <a:r>
-              <a:rPr lang="en-US" dirty="0" err="1">
-                <a:solidFill>
-                  <a:srgbClr val="005AB4"/>
-                </a:solidFill>
-              </a:rPr>
-              <a:t>xsl:template</a:t>
-            </a:r>
-            <a:r>
-              <a:rPr lang="en-US" dirty="0">
-                <a:solidFill>
-                  <a:srgbClr val="005AB4"/>
-                </a:solidFill>
-              </a:rPr>
-              <a:t>&gt;</a:t>
-            </a:r>
-            <a:endParaRPr lang="en-US" dirty="0" smtClean="0"/>
-          </a:p>
-        </p:txBody>
-      </p:sp>
-      <p:sp>
-        <p:nvSpPr>
-          <p:cNvPr id="3" name="TextBox 2"/>
-          <p:cNvSpPr txBox="1"/>
-          <p:nvPr/>
-        </p:nvSpPr>
-        <p:spPr>
-          <a:xfrm>
-            <a:off x="340963" y="495946"/>
-            <a:ext cx="7873139" cy="461665"/>
-          </a:xfrm>
-          <a:prstGeom prst="rect">
-            <a:avLst/>
-          </a:prstGeom>
-          <a:noFill/>
-        </p:spPr>
-        <p:txBody>
-          <a:bodyPr wrap="square" rtlCol="0">
-            <a:spAutoFit/>
-          </a:bodyPr>
-          <a:lstStyle/>
-          <a:p>
-            <a:pPr algn="ctr"/>
-            <a:r>
-              <a:rPr lang="en-US" sz="2400" dirty="0" smtClean="0"/>
-              <a:t>XSLT for Up-Conversion, adding </a:t>
-            </a:r>
-            <a:r>
-              <a:rPr lang="en-US" sz="2400" dirty="0" err="1" smtClean="0"/>
-              <a:t>xml:ids</a:t>
-            </a:r>
-            <a:endParaRPr lang="en-US" sz="2400" dirty="0"/>
-          </a:p>
-        </p:txBody>
-      </p:sp>
-    </p:spTree>
-    <p:extLst>
-      <p:ext uri="{BB962C8B-B14F-4D97-AF65-F5344CB8AC3E}">
-        <p14:creationId xmlns:p14="http://schemas.microsoft.com/office/powerpoint/2010/main" val="573634327"/>
-      </p:ext>
-    </p:extLst>
-  </p:cSld>
-  <p:clrMapOvr>
-    <a:masterClrMapping/>
-  </p:clrMapOvr>
-  <p:timing>
-    <p:tnLst>
-      <p:par>
-        <p:cTn xmlns:p14="http://schemas.microsoft.com/office/powerpoint/2010/main" id="1" dur="indefinite" restart="never" nodeType="tmRoot"/>
-      </p:par>
-    </p:tnLst>
-  </p:timing>
-</p:sld>
-</file>
-
-<file path=ppt/slides/slide13.xml><?xml version="1.0" encoding="utf-8"?>
-<p:sld xmlns:a="http://schemas.openxmlformats.org/drawingml/2006/main" xmlns:r="http://schemas.openxmlformats.org/officeDocument/2006/relationships" xmlns:p="http://schemas.openxmlformats.org/presentationml/2006/main">
-  <p:cSld>
-    <p:spTree>
-      <p:nvGrpSpPr>
-        <p:cNvPr id="1" name=""/>
-        <p:cNvGrpSpPr/>
-        <p:nvPr/>
-      </p:nvGrpSpPr>
-      <p:grpSpPr>
-        <a:xfrm>
-          <a:off x="0" y="0"/>
-          <a:ext cx="0" cy="0"/>
-          <a:chOff x="0" y="0"/>
-          <a:chExt cx="0" cy="0"/>
-        </a:xfrm>
-      </p:grpSpPr>
       <p:pic>
         <p:nvPicPr>
           <p:cNvPr id="3" name="Picture 2"/>
@@ -8165,946 +6080,7 @@
 </p:sld>
 </file>
 
-<file path=ppt/slides/slide14.xml><?xml version="1.0" encoding="utf-8"?>
-<p:sld xmlns:a="http://schemas.openxmlformats.org/drawingml/2006/main" xmlns:r="http://schemas.openxmlformats.org/officeDocument/2006/relationships" xmlns:p="http://schemas.openxmlformats.org/presentationml/2006/main">
-  <p:cSld>
-    <p:spTree>
-      <p:nvGrpSpPr>
-        <p:cNvPr id="1" name=""/>
-        <p:cNvGrpSpPr/>
-        <p:nvPr/>
-      </p:nvGrpSpPr>
-      <p:grpSpPr>
-        <a:xfrm>
-          <a:off x="0" y="0"/>
-          <a:ext cx="0" cy="0"/>
-          <a:chOff x="0" y="0"/>
-          <a:chExt cx="0" cy="0"/>
-        </a:xfrm>
-      </p:grpSpPr>
-      <p:pic>
-        <p:nvPicPr>
-          <p:cNvPr id="3" name="Content Placeholder 2" descr="Screen Shot 2015-10-30 at 4.57.16 PM.png"/>
-          <p:cNvPicPr>
-            <a:picLocks noGrp="1" noChangeAspect="1"/>
-          </p:cNvPicPr>
-          <p:nvPr>
-            <p:ph idx="1"/>
-          </p:nvPr>
-        </p:nvPicPr>
-        <p:blipFill rotWithShape="1">
-          <a:blip r:embed="rId3">
-            <a:extLst>
-              <a:ext uri="{28A0092B-C50C-407E-A947-70E740481C1C}">
-                <a14:useLocalDpi xmlns:a14="http://schemas.microsoft.com/office/drawing/2010/main" val="0"/>
-              </a:ext>
-            </a:extLst>
-          </a:blip>
-          <a:srcRect l="-12622" r="5459"/>
-          <a:stretch/>
-        </p:blipFill>
-        <p:spPr>
-          <a:xfrm>
-            <a:off x="133117" y="611980"/>
-            <a:ext cx="8565406" cy="5932142"/>
-          </a:xfrm>
-        </p:spPr>
-      </p:pic>
-    </p:spTree>
-    <p:extLst>
-      <p:ext uri="{BB962C8B-B14F-4D97-AF65-F5344CB8AC3E}">
-        <p14:creationId xmlns:p14="http://schemas.microsoft.com/office/powerpoint/2010/main" val="1902750996"/>
-      </p:ext>
-    </p:extLst>
-  </p:cSld>
-  <p:clrMapOvr>
-    <a:masterClrMapping/>
-  </p:clrMapOvr>
-  <p:timing>
-    <p:tnLst>
-      <p:par>
-        <p:cTn xmlns:p14="http://schemas.microsoft.com/office/powerpoint/2010/main" id="1" dur="indefinite" restart="never" nodeType="tmRoot"/>
-      </p:par>
-    </p:tnLst>
-  </p:timing>
-</p:sld>
-</file>
-
-<file path=ppt/slides/slide15.xml><?xml version="1.0" encoding="utf-8"?>
-<p:sld xmlns:a="http://schemas.openxmlformats.org/drawingml/2006/main" xmlns:r="http://schemas.openxmlformats.org/officeDocument/2006/relationships" xmlns:p="http://schemas.openxmlformats.org/presentationml/2006/main">
-  <p:cSld>
-    <p:spTree>
-      <p:nvGrpSpPr>
-        <p:cNvPr id="1" name=""/>
-        <p:cNvGrpSpPr/>
-        <p:nvPr/>
-      </p:nvGrpSpPr>
-      <p:grpSpPr>
-        <a:xfrm>
-          <a:off x="0" y="0"/>
-          <a:ext cx="0" cy="0"/>
-          <a:chOff x="0" y="0"/>
-          <a:chExt cx="0" cy="0"/>
-        </a:xfrm>
-      </p:grpSpPr>
-      <p:sp>
-        <p:nvSpPr>
-          <p:cNvPr id="2" name="Content Placeholder 1"/>
-          <p:cNvSpPr>
-            <a:spLocks noGrp="1"/>
-          </p:cNvSpPr>
-          <p:nvPr>
-            <p:ph idx="1"/>
-          </p:nvPr>
-        </p:nvSpPr>
-        <p:spPr>
-          <a:xfrm>
-            <a:off x="164124" y="2286000"/>
-            <a:ext cx="8604738" cy="4425461"/>
-          </a:xfrm>
-        </p:spPr>
-        <p:txBody>
-          <a:bodyPr>
-            <a:normAutofit lnSpcReduction="10000"/>
-          </a:bodyPr>
-          <a:lstStyle/>
-          <a:p>
-            <a:pPr marL="0" indent="0">
-              <a:buNone/>
-            </a:pPr>
-            <a:r>
-              <a:rPr lang="en-US" dirty="0" smtClean="0">
-                <a:solidFill>
-                  <a:srgbClr val="005AB4"/>
-                </a:solidFill>
-              </a:rPr>
-              <a:t>&lt;</a:t>
-            </a:r>
-            <a:r>
-              <a:rPr lang="en-US" dirty="0" err="1">
-                <a:solidFill>
-                  <a:srgbClr val="005AB4"/>
-                </a:solidFill>
-              </a:rPr>
-              <a:t>xsl:element</a:t>
-            </a:r>
-            <a:r>
-              <a:rPr lang="en-US" dirty="0">
-                <a:solidFill>
-                  <a:srgbClr val="F5844C"/>
-                </a:solidFill>
-              </a:rPr>
-              <a:t> name</a:t>
-            </a:r>
-            <a:r>
-              <a:rPr lang="en-US" dirty="0">
-                <a:solidFill>
-                  <a:srgbClr val="FF8040"/>
-                </a:solidFill>
-              </a:rPr>
-              <a:t>=</a:t>
-            </a:r>
-            <a:r>
-              <a:rPr lang="en-US" dirty="0">
-                <a:solidFill>
-                  <a:srgbClr val="993300"/>
-                </a:solidFill>
-              </a:rPr>
-              <a:t>"f"</a:t>
-            </a:r>
-            <a:r>
-              <a:rPr lang="en-US" dirty="0">
-                <a:solidFill>
-                  <a:srgbClr val="000096"/>
-                </a:solidFill>
-              </a:rPr>
-              <a:t>&gt;</a:t>
-            </a:r>
-            <a:r>
-              <a:rPr lang="en-US" dirty="0">
-                <a:solidFill>
-                  <a:srgbClr val="000000"/>
-                </a:solidFill>
-              </a:rPr>
-              <a:t/>
-            </a:r>
-            <a:br>
-              <a:rPr lang="en-US" dirty="0">
-                <a:solidFill>
-                  <a:srgbClr val="000000"/>
-                </a:solidFill>
-              </a:rPr>
-            </a:br>
-            <a:r>
-              <a:rPr lang="en-US" dirty="0">
-                <a:solidFill>
-                  <a:srgbClr val="000000"/>
-                </a:solidFill>
-              </a:rPr>
-              <a:t>                </a:t>
-            </a:r>
-            <a:r>
-              <a:rPr lang="en-US" dirty="0">
-                <a:solidFill>
-                  <a:srgbClr val="005AB4"/>
-                </a:solidFill>
-              </a:rPr>
-              <a:t>&lt;</a:t>
-            </a:r>
-            <a:r>
-              <a:rPr lang="en-US" dirty="0" err="1">
-                <a:solidFill>
-                  <a:srgbClr val="005AB4"/>
-                </a:solidFill>
-              </a:rPr>
-              <a:t>xsl:attribute</a:t>
-            </a:r>
-            <a:r>
-              <a:rPr lang="en-US" dirty="0">
-                <a:solidFill>
-                  <a:srgbClr val="F5844C"/>
-                </a:solidFill>
-              </a:rPr>
-              <a:t> name</a:t>
-            </a:r>
-            <a:r>
-              <a:rPr lang="en-US" dirty="0">
-                <a:solidFill>
-                  <a:srgbClr val="FF8040"/>
-                </a:solidFill>
-              </a:rPr>
-              <a:t>=</a:t>
-            </a:r>
-            <a:r>
-              <a:rPr lang="en-US" dirty="0">
-                <a:solidFill>
-                  <a:srgbClr val="993300"/>
-                </a:solidFill>
-              </a:rPr>
-              <a:t>"name"</a:t>
-            </a:r>
-            <a:r>
-              <a:rPr lang="en-US" dirty="0">
-                <a:solidFill>
-                  <a:srgbClr val="000096"/>
-                </a:solidFill>
-              </a:rPr>
-              <a:t>&gt;</a:t>
-            </a:r>
-            <a:r>
-              <a:rPr lang="en-US" dirty="0" err="1">
-                <a:solidFill>
-                  <a:srgbClr val="000000"/>
-                </a:solidFill>
-              </a:rPr>
-              <a:t>southey</a:t>
-            </a:r>
-            <a:r>
-              <a:rPr lang="en-US" dirty="0">
-                <a:solidFill>
-                  <a:srgbClr val="005AB4"/>
-                </a:solidFill>
-              </a:rPr>
-              <a:t>&lt;/</a:t>
-            </a:r>
-            <a:r>
-              <a:rPr lang="en-US" dirty="0" err="1">
-                <a:solidFill>
-                  <a:srgbClr val="005AB4"/>
-                </a:solidFill>
-              </a:rPr>
-              <a:t>xsl:attribute</a:t>
-            </a:r>
-            <a:r>
-              <a:rPr lang="en-US" dirty="0">
-                <a:solidFill>
-                  <a:srgbClr val="005AB4"/>
-                </a:solidFill>
-              </a:rPr>
-              <a:t>&gt;</a:t>
-            </a:r>
-            <a:r>
-              <a:rPr lang="en-US" dirty="0">
-                <a:solidFill>
-                  <a:srgbClr val="000000"/>
-                </a:solidFill>
-              </a:rPr>
-              <a:t/>
-            </a:r>
-            <a:br>
-              <a:rPr lang="en-US" dirty="0">
-                <a:solidFill>
-                  <a:srgbClr val="000000"/>
-                </a:solidFill>
-              </a:rPr>
-            </a:br>
-            <a:r>
-              <a:rPr lang="en-US" dirty="0">
-                <a:solidFill>
-                  <a:srgbClr val="000000"/>
-                </a:solidFill>
-              </a:rPr>
-              <a:t>                </a:t>
-            </a:r>
-            <a:r>
-              <a:rPr lang="en-US" dirty="0">
-                <a:solidFill>
-                  <a:srgbClr val="005AB4"/>
-                </a:solidFill>
-              </a:rPr>
-              <a:t>&lt;</a:t>
-            </a:r>
-            <a:r>
-              <a:rPr lang="en-US" dirty="0" err="1">
-                <a:solidFill>
-                  <a:srgbClr val="005AB4"/>
-                </a:solidFill>
-              </a:rPr>
-              <a:t>xsl:attribute</a:t>
-            </a:r>
-            <a:r>
-              <a:rPr lang="en-US" dirty="0">
-                <a:solidFill>
-                  <a:srgbClr val="F5844C"/>
-                </a:solidFill>
-              </a:rPr>
-              <a:t> name</a:t>
-            </a:r>
-            <a:r>
-              <a:rPr lang="en-US" dirty="0">
-                <a:solidFill>
-                  <a:srgbClr val="FF8040"/>
-                </a:solidFill>
-              </a:rPr>
-              <a:t>=</a:t>
-            </a:r>
-            <a:r>
-              <a:rPr lang="en-US" dirty="0">
-                <a:solidFill>
-                  <a:srgbClr val="993300"/>
-                </a:solidFill>
-              </a:rPr>
-              <a:t>"n"</a:t>
-            </a:r>
-            <a:r>
-              <a:rPr lang="en-US" dirty="0">
-                <a:solidFill>
-                  <a:srgbClr val="000096"/>
-                </a:solidFill>
-              </a:rPr>
-              <a:t>&gt;</a:t>
-            </a:r>
-            <a:r>
-              <a:rPr lang="en-US" dirty="0">
-                <a:solidFill>
-                  <a:srgbClr val="000000"/>
-                </a:solidFill>
-              </a:rPr>
-              <a:t/>
-            </a:r>
-            <a:br>
-              <a:rPr lang="en-US" dirty="0">
-                <a:solidFill>
-                  <a:srgbClr val="000000"/>
-                </a:solidFill>
-              </a:rPr>
-            </a:br>
-            <a:r>
-              <a:rPr lang="en-US" dirty="0">
-                <a:solidFill>
-                  <a:srgbClr val="000000"/>
-                </a:solidFill>
-              </a:rPr>
-              <a:t>                    </a:t>
-            </a:r>
-            <a:r>
-              <a:rPr lang="en-US" dirty="0">
-                <a:solidFill>
-                  <a:srgbClr val="005AB4"/>
-                </a:solidFill>
-              </a:rPr>
-              <a:t>&lt;</a:t>
-            </a:r>
-            <a:r>
-              <a:rPr lang="en-US" dirty="0" err="1">
-                <a:solidFill>
-                  <a:srgbClr val="005AB4"/>
-                </a:solidFill>
-              </a:rPr>
-              <a:t>xsl:value-of</a:t>
-            </a:r>
-            <a:r>
-              <a:rPr lang="en-US" dirty="0">
-                <a:solidFill>
-                  <a:srgbClr val="F5844C"/>
-                </a:solidFill>
-              </a:rPr>
-              <a:t> select</a:t>
-            </a:r>
-            <a:r>
-              <a:rPr lang="en-US" dirty="0">
-                <a:solidFill>
-                  <a:srgbClr val="FF8040"/>
-                </a:solidFill>
-              </a:rPr>
-              <a:t>=</a:t>
-            </a:r>
-            <a:r>
-              <a:rPr lang="en-US" dirty="0">
-                <a:solidFill>
-                  <a:srgbClr val="993300"/>
-                </a:solidFill>
-              </a:rPr>
-              <a:t>"$</a:t>
-            </a:r>
-            <a:r>
-              <a:rPr lang="en-US" dirty="0" err="1">
-                <a:solidFill>
-                  <a:srgbClr val="993300"/>
-                </a:solidFill>
-              </a:rPr>
-              <a:t>southey</a:t>
-            </a:r>
-            <a:r>
-              <a:rPr lang="en-US" dirty="0">
-                <a:solidFill>
-                  <a:srgbClr val="993300"/>
-                </a:solidFill>
-              </a:rPr>
-              <a:t>-words"</a:t>
-            </a:r>
-            <a:r>
-              <a:rPr lang="en-US" dirty="0">
-                <a:solidFill>
-                  <a:srgbClr val="000096"/>
-                </a:solidFill>
-              </a:rPr>
-              <a:t>/&gt;</a:t>
-            </a:r>
-            <a:r>
-              <a:rPr lang="en-US" dirty="0">
-                <a:solidFill>
-                  <a:srgbClr val="000000"/>
-                </a:solidFill>
-              </a:rPr>
-              <a:t/>
-            </a:r>
-            <a:br>
-              <a:rPr lang="en-US" dirty="0">
-                <a:solidFill>
-                  <a:srgbClr val="000000"/>
-                </a:solidFill>
-              </a:rPr>
-            </a:br>
-            <a:r>
-              <a:rPr lang="en-US" dirty="0">
-                <a:solidFill>
-                  <a:srgbClr val="000000"/>
-                </a:solidFill>
-              </a:rPr>
-              <a:t>                </a:t>
-            </a:r>
-            <a:r>
-              <a:rPr lang="en-US" dirty="0">
-                <a:solidFill>
-                  <a:srgbClr val="005AB4"/>
-                </a:solidFill>
-              </a:rPr>
-              <a:t>&lt;/</a:t>
-            </a:r>
-            <a:r>
-              <a:rPr lang="en-US" dirty="0" err="1">
-                <a:solidFill>
-                  <a:srgbClr val="005AB4"/>
-                </a:solidFill>
-              </a:rPr>
-              <a:t>xsl:attribute</a:t>
-            </a:r>
-            <a:r>
-              <a:rPr lang="en-US" dirty="0">
-                <a:solidFill>
-                  <a:srgbClr val="005AB4"/>
-                </a:solidFill>
-              </a:rPr>
-              <a:t>&gt;</a:t>
-            </a:r>
-            <a:r>
-              <a:rPr lang="en-US" dirty="0">
-                <a:solidFill>
-                  <a:srgbClr val="000000"/>
-                </a:solidFill>
-              </a:rPr>
-              <a:t/>
-            </a:r>
-            <a:br>
-              <a:rPr lang="en-US" dirty="0">
-                <a:solidFill>
-                  <a:srgbClr val="000000"/>
-                </a:solidFill>
-              </a:rPr>
-            </a:br>
-            <a:r>
-              <a:rPr lang="en-US" dirty="0">
-                <a:solidFill>
-                  <a:srgbClr val="000000"/>
-                </a:solidFill>
-              </a:rPr>
-              <a:t>                </a:t>
-            </a:r>
-            <a:r>
-              <a:rPr lang="en-US" dirty="0">
-                <a:solidFill>
-                  <a:srgbClr val="005AB4"/>
-                </a:solidFill>
-              </a:rPr>
-              <a:t>&lt;</a:t>
-            </a:r>
-            <a:r>
-              <a:rPr lang="en-US" dirty="0" err="1">
-                <a:solidFill>
-                  <a:srgbClr val="005AB4"/>
-                </a:solidFill>
-              </a:rPr>
-              <a:t>xsl:if</a:t>
-            </a:r>
-            <a:r>
-              <a:rPr lang="en-US" dirty="0">
-                <a:solidFill>
-                  <a:srgbClr val="F5844C"/>
-                </a:solidFill>
-              </a:rPr>
-              <a:t> test</a:t>
-            </a:r>
-            <a:r>
-              <a:rPr lang="en-US" dirty="0">
-                <a:solidFill>
-                  <a:srgbClr val="FF8040"/>
-                </a:solidFill>
-              </a:rPr>
-              <a:t>=</a:t>
-            </a:r>
-            <a:r>
-              <a:rPr lang="en-US" dirty="0">
-                <a:solidFill>
-                  <a:srgbClr val="993300"/>
-                </a:solidFill>
-              </a:rPr>
-              <a:t>"@synch"</a:t>
-            </a:r>
-            <a:r>
-              <a:rPr lang="en-US" dirty="0">
-                <a:solidFill>
-                  <a:srgbClr val="000096"/>
-                </a:solidFill>
-              </a:rPr>
-              <a:t>&gt;</a:t>
-            </a:r>
-            <a:r>
-              <a:rPr lang="en-US" dirty="0">
-                <a:solidFill>
-                  <a:srgbClr val="000000"/>
-                </a:solidFill>
-              </a:rPr>
-              <a:t/>
-            </a:r>
-            <a:br>
-              <a:rPr lang="en-US" dirty="0">
-                <a:solidFill>
-                  <a:srgbClr val="000000"/>
-                </a:solidFill>
-              </a:rPr>
-            </a:br>
-            <a:r>
-              <a:rPr lang="en-US" dirty="0">
-                <a:solidFill>
-                  <a:srgbClr val="000000"/>
-                </a:solidFill>
-              </a:rPr>
-              <a:t>                    </a:t>
-            </a:r>
-            <a:r>
-              <a:rPr lang="en-US" dirty="0">
-                <a:solidFill>
-                  <a:srgbClr val="005AB4"/>
-                </a:solidFill>
-              </a:rPr>
-              <a:t>&lt;</a:t>
-            </a:r>
-            <a:r>
-              <a:rPr lang="en-US" dirty="0" err="1">
-                <a:solidFill>
-                  <a:srgbClr val="005AB4"/>
-                </a:solidFill>
-              </a:rPr>
-              <a:t>xsl:attribute</a:t>
-            </a:r>
-            <a:r>
-              <a:rPr lang="en-US" dirty="0">
-                <a:solidFill>
-                  <a:srgbClr val="F5844C"/>
-                </a:solidFill>
-              </a:rPr>
-              <a:t> name</a:t>
-            </a:r>
-            <a:r>
-              <a:rPr lang="en-US" dirty="0">
-                <a:solidFill>
-                  <a:srgbClr val="FF8040"/>
-                </a:solidFill>
-              </a:rPr>
-              <a:t>=</a:t>
-            </a:r>
-            <a:r>
-              <a:rPr lang="en-US" dirty="0">
-                <a:solidFill>
-                  <a:srgbClr val="993300"/>
-                </a:solidFill>
-              </a:rPr>
-              <a:t>"</a:t>
-            </a:r>
-            <a:r>
-              <a:rPr lang="en-US" dirty="0" err="1">
-                <a:solidFill>
-                  <a:srgbClr val="993300"/>
-                </a:solidFill>
-              </a:rPr>
-              <a:t>ana</a:t>
-            </a:r>
-            <a:r>
-              <a:rPr lang="en-US" dirty="0">
-                <a:solidFill>
-                  <a:srgbClr val="993300"/>
-                </a:solidFill>
-              </a:rPr>
-              <a:t>"</a:t>
-            </a:r>
-            <a:r>
-              <a:rPr lang="en-US" dirty="0">
-                <a:solidFill>
-                  <a:srgbClr val="000096"/>
-                </a:solidFill>
-              </a:rPr>
-              <a:t>&gt;</a:t>
-            </a:r>
-            <a:r>
-              <a:rPr lang="en-US" dirty="0">
-                <a:solidFill>
-                  <a:srgbClr val="005AB4"/>
-                </a:solidFill>
-              </a:rPr>
-              <a:t>&lt;</a:t>
-            </a:r>
-            <a:r>
-              <a:rPr lang="en-US" dirty="0" err="1">
-                <a:solidFill>
-                  <a:srgbClr val="005AB4"/>
-                </a:solidFill>
-              </a:rPr>
-              <a:t>xsl:value-of</a:t>
-            </a:r>
-            <a:r>
-              <a:rPr lang="en-US" dirty="0">
-                <a:solidFill>
-                  <a:srgbClr val="000000"/>
-                </a:solidFill>
-              </a:rPr>
-              <a:t/>
-            </a:r>
-            <a:br>
-              <a:rPr lang="en-US" dirty="0">
-                <a:solidFill>
-                  <a:srgbClr val="000000"/>
-                </a:solidFill>
-              </a:rPr>
-            </a:br>
-            <a:r>
-              <a:rPr lang="en-US" dirty="0">
-                <a:solidFill>
-                  <a:srgbClr val="F5844C"/>
-                </a:solidFill>
-              </a:rPr>
-              <a:t>                        select</a:t>
-            </a:r>
-            <a:r>
-              <a:rPr lang="en-US" dirty="0">
-                <a:solidFill>
-                  <a:srgbClr val="FF8040"/>
-                </a:solidFill>
-              </a:rPr>
-              <a:t>=</a:t>
-            </a:r>
-            <a:r>
-              <a:rPr lang="en-US" dirty="0">
-                <a:solidFill>
-                  <a:srgbClr val="993300"/>
-                </a:solidFill>
-              </a:rPr>
-              <a:t>"round-half-to-even(($</a:t>
-            </a:r>
-            <a:r>
-              <a:rPr lang="en-US" dirty="0" err="1">
-                <a:solidFill>
-                  <a:srgbClr val="993300"/>
-                </a:solidFill>
-              </a:rPr>
-              <a:t>montalvo</a:t>
-            </a:r>
-            <a:r>
-              <a:rPr lang="en-US" dirty="0">
-                <a:solidFill>
-                  <a:srgbClr val="993300"/>
-                </a:solidFill>
-              </a:rPr>
-              <a:t>-words - $</a:t>
-            </a:r>
-            <a:r>
-              <a:rPr lang="en-US" dirty="0" err="1">
-                <a:solidFill>
-                  <a:srgbClr val="993300"/>
-                </a:solidFill>
-              </a:rPr>
-              <a:t>southey</a:t>
-            </a:r>
-            <a:r>
-              <a:rPr lang="en-US" dirty="0">
-                <a:solidFill>
-                  <a:srgbClr val="993300"/>
-                </a:solidFill>
-              </a:rPr>
-              <a:t>-words) div $</a:t>
-            </a:r>
-            <a:r>
-              <a:rPr lang="en-US" dirty="0" err="1">
-                <a:solidFill>
-                  <a:srgbClr val="993300"/>
-                </a:solidFill>
-              </a:rPr>
-              <a:t>southey</a:t>
-            </a:r>
-            <a:r>
-              <a:rPr lang="en-US" dirty="0">
-                <a:solidFill>
-                  <a:srgbClr val="993300"/>
-                </a:solidFill>
-              </a:rPr>
-              <a:t>-words, 2)"</a:t>
-            </a:r>
-            <a:r>
-              <a:rPr lang="en-US" dirty="0">
-                <a:solidFill>
-                  <a:srgbClr val="000000"/>
-                </a:solidFill>
-              </a:rPr>
-              <a:t/>
-            </a:r>
-            <a:br>
-              <a:rPr lang="en-US" dirty="0">
-                <a:solidFill>
-                  <a:srgbClr val="000000"/>
-                </a:solidFill>
-              </a:rPr>
-            </a:br>
-            <a:r>
-              <a:rPr lang="en-US" dirty="0">
-                <a:solidFill>
-                  <a:srgbClr val="F5844C"/>
-                </a:solidFill>
-              </a:rPr>
-              <a:t>                    </a:t>
-            </a:r>
-            <a:r>
-              <a:rPr lang="en-US" dirty="0">
-                <a:solidFill>
-                  <a:srgbClr val="000096"/>
-                </a:solidFill>
-              </a:rPr>
-              <a:t>/&gt;</a:t>
-            </a:r>
-            <a:r>
-              <a:rPr lang="en-US" dirty="0">
-                <a:solidFill>
-                  <a:srgbClr val="000000"/>
-                </a:solidFill>
-              </a:rPr>
-              <a:t/>
-            </a:r>
-            <a:br>
-              <a:rPr lang="en-US" dirty="0">
-                <a:solidFill>
-                  <a:srgbClr val="000000"/>
-                </a:solidFill>
-              </a:rPr>
-            </a:br>
-            <a:r>
-              <a:rPr lang="en-US" dirty="0">
-                <a:solidFill>
-                  <a:srgbClr val="000000"/>
-                </a:solidFill>
-              </a:rPr>
-              <a:t>                    </a:t>
-            </a:r>
-            <a:r>
-              <a:rPr lang="en-US" dirty="0">
-                <a:solidFill>
-                  <a:srgbClr val="005AB4"/>
-                </a:solidFill>
-              </a:rPr>
-              <a:t>&lt;/</a:t>
-            </a:r>
-            <a:r>
-              <a:rPr lang="en-US" dirty="0" err="1">
-                <a:solidFill>
-                  <a:srgbClr val="005AB4"/>
-                </a:solidFill>
-              </a:rPr>
-              <a:t>xsl:attribute</a:t>
-            </a:r>
-            <a:r>
-              <a:rPr lang="en-US" dirty="0">
-                <a:solidFill>
-                  <a:srgbClr val="005AB4"/>
-                </a:solidFill>
-              </a:rPr>
-              <a:t>&gt;</a:t>
-            </a:r>
-            <a:r>
-              <a:rPr lang="en-US" dirty="0">
-                <a:solidFill>
-                  <a:srgbClr val="000000"/>
-                </a:solidFill>
-              </a:rPr>
-              <a:t/>
-            </a:r>
-            <a:br>
-              <a:rPr lang="en-US" dirty="0">
-                <a:solidFill>
-                  <a:srgbClr val="000000"/>
-                </a:solidFill>
-              </a:rPr>
-            </a:br>
-            <a:r>
-              <a:rPr lang="en-US" dirty="0">
-                <a:solidFill>
-                  <a:srgbClr val="000000"/>
-                </a:solidFill>
-              </a:rPr>
-              <a:t>                </a:t>
-            </a:r>
-            <a:r>
-              <a:rPr lang="en-US" dirty="0">
-                <a:solidFill>
-                  <a:srgbClr val="005AB4"/>
-                </a:solidFill>
-              </a:rPr>
-              <a:t>&lt;/</a:t>
-            </a:r>
-            <a:r>
-              <a:rPr lang="en-US" dirty="0" err="1">
-                <a:solidFill>
-                  <a:srgbClr val="005AB4"/>
-                </a:solidFill>
-              </a:rPr>
-              <a:t>xsl:if</a:t>
-            </a:r>
-            <a:r>
-              <a:rPr lang="en-US" dirty="0">
-                <a:solidFill>
-                  <a:srgbClr val="005AB4"/>
-                </a:solidFill>
-              </a:rPr>
-              <a:t>&gt;</a:t>
-            </a:r>
-            <a:endParaRPr lang="en-US" dirty="0"/>
-          </a:p>
-        </p:txBody>
-      </p:sp>
-      <p:sp>
-        <p:nvSpPr>
-          <p:cNvPr id="4" name="TextBox 3"/>
-          <p:cNvSpPr txBox="1"/>
-          <p:nvPr/>
-        </p:nvSpPr>
-        <p:spPr>
-          <a:xfrm>
-            <a:off x="164123" y="457200"/>
-            <a:ext cx="8604739" cy="1477328"/>
-          </a:xfrm>
-          <a:prstGeom prst="rect">
-            <a:avLst/>
-          </a:prstGeom>
-          <a:noFill/>
-        </p:spPr>
-        <p:txBody>
-          <a:bodyPr wrap="square" rtlCol="0">
-            <a:spAutoFit/>
-          </a:bodyPr>
-          <a:lstStyle/>
-          <a:p>
-            <a:r>
-              <a:rPr lang="en-US" b="1" dirty="0" smtClean="0"/>
-              <a:t>A snippet of XSLT: Constructing the &lt;f</a:t>
-            </a:r>
-            <a:r>
-              <a:rPr lang="en-US" b="1" dirty="0"/>
-              <a:t>&gt;</a:t>
-            </a:r>
-            <a:r>
-              <a:rPr lang="en-US" b="1" dirty="0" smtClean="0"/>
-              <a:t> element for Southey in a given &lt;fs&gt;</a:t>
-            </a:r>
-          </a:p>
-          <a:p>
-            <a:pPr marL="285750" indent="-285750">
-              <a:buFont typeface="Arial" panose="020B0604020202020204" pitchFamily="34" charset="0"/>
-              <a:buChar char="•"/>
-            </a:pPr>
-            <a:r>
-              <a:rPr lang="en-US" dirty="0" smtClean="0"/>
-              <a:t>If an @synch attribute is present on an &lt;anchor&gt;, the passage is linked to Montalvo. </a:t>
-            </a:r>
-          </a:p>
-          <a:p>
-            <a:pPr marL="285750" indent="-285750">
-              <a:buFont typeface="Arial" panose="020B0604020202020204" pitchFamily="34" charset="0"/>
-              <a:buChar char="•"/>
-            </a:pPr>
-            <a:r>
-              <a:rPr lang="en-US" dirty="0" smtClean="0"/>
-              <a:t>@</a:t>
-            </a:r>
-            <a:r>
-              <a:rPr lang="en-US" dirty="0" err="1" smtClean="0"/>
-              <a:t>ana</a:t>
-            </a:r>
-            <a:r>
-              <a:rPr lang="en-US" dirty="0" smtClean="0"/>
-              <a:t> is a calculation of the proportion by which Montalvo’s word count differs from Southey’s</a:t>
-            </a:r>
-            <a:endParaRPr lang="en-US" dirty="0"/>
-          </a:p>
-        </p:txBody>
-      </p:sp>
-    </p:spTree>
-    <p:extLst>
-      <p:ext uri="{BB962C8B-B14F-4D97-AF65-F5344CB8AC3E}">
-        <p14:creationId xmlns:p14="http://schemas.microsoft.com/office/powerpoint/2010/main" val="2710045223"/>
-      </p:ext>
-    </p:extLst>
-  </p:cSld>
-  <p:clrMapOvr>
-    <a:masterClrMapping/>
-  </p:clrMapOvr>
-  <p:timing>
-    <p:tnLst>
-      <p:par>
-        <p:cTn xmlns:p14="http://schemas.microsoft.com/office/powerpoint/2010/main" id="1" dur="indefinite" restart="never" nodeType="tmRoot"/>
-      </p:par>
-    </p:tnLst>
-  </p:timing>
-</p:sld>
-</file>
-
-<file path=ppt/slides/slide16.xml><?xml version="1.0" encoding="utf-8"?>
+<file path=ppt/slides/slide12.xml><?xml version="1.0" encoding="utf-8"?>
 <p:sld xmlns:a="http://schemas.openxmlformats.org/drawingml/2006/main" xmlns:r="http://schemas.openxmlformats.org/officeDocument/2006/relationships" xmlns:p="http://schemas.openxmlformats.org/presentationml/2006/main">
   <p:cSld>
     <p:spTree>
@@ -9171,123 +6147,7 @@
 </p:sld>
 </file>
 
-<file path=ppt/slides/slide17.xml><?xml version="1.0" encoding="utf-8"?>
-<p:sld xmlns:a="http://schemas.openxmlformats.org/drawingml/2006/main" xmlns:r="http://schemas.openxmlformats.org/officeDocument/2006/relationships" xmlns:p="http://schemas.openxmlformats.org/presentationml/2006/main">
-  <p:cSld>
-    <p:spTree>
-      <p:nvGrpSpPr>
-        <p:cNvPr id="1" name=""/>
-        <p:cNvGrpSpPr/>
-        <p:nvPr/>
-      </p:nvGrpSpPr>
-      <p:grpSpPr>
-        <a:xfrm>
-          <a:off x="0" y="0"/>
-          <a:ext cx="0" cy="0"/>
-          <a:chOff x="0" y="0"/>
-          <a:chExt cx="0" cy="0"/>
-        </a:xfrm>
-      </p:grpSpPr>
-      <p:sp>
-        <p:nvSpPr>
-          <p:cNvPr id="2" name="Content Placeholder 1"/>
-          <p:cNvSpPr>
-            <a:spLocks noGrp="1"/>
-          </p:cNvSpPr>
-          <p:nvPr>
-            <p:ph idx="1"/>
-          </p:nvPr>
-        </p:nvSpPr>
-        <p:spPr>
-          <a:xfrm>
-            <a:off x="625507" y="2227479"/>
-            <a:ext cx="8229600" cy="4091214"/>
-          </a:xfrm>
-        </p:spPr>
-        <p:txBody>
-          <a:bodyPr>
-            <a:normAutofit/>
-          </a:bodyPr>
-          <a:lstStyle/>
-          <a:p>
-            <a:pPr marL="0" indent="0">
-              <a:lnSpc>
-                <a:spcPct val="130000"/>
-              </a:lnSpc>
-              <a:buNone/>
-            </a:pPr>
-            <a:r>
-              <a:rPr lang="en-US" sz="2800" dirty="0" smtClean="0"/>
-              <a:t>“To </a:t>
-            </a:r>
-            <a:r>
-              <a:rPr lang="en-US" sz="2800" dirty="0"/>
-              <a:t>have translated a closely printed folio would have been absurd. I have reduced it to about half its length, by abridging the words, not the story […] There is no vanity in saying, that this has improved the book, for what long work may not be improved by compression</a:t>
-            </a:r>
-            <a:r>
-              <a:rPr lang="en-US" sz="2800" dirty="0" smtClean="0"/>
-              <a:t>?”</a:t>
-            </a:r>
-            <a:endParaRPr lang="en-US" sz="2800" dirty="0"/>
-          </a:p>
-        </p:txBody>
-      </p:sp>
-      <p:sp>
-        <p:nvSpPr>
-          <p:cNvPr id="4" name="Title 1"/>
-          <p:cNvSpPr>
-            <a:spLocks noGrp="1"/>
-          </p:cNvSpPr>
-          <p:nvPr>
-            <p:ph type="title"/>
-          </p:nvPr>
-        </p:nvSpPr>
-        <p:spPr>
-          <a:xfrm>
-            <a:off x="227691" y="869989"/>
-            <a:ext cx="8229600" cy="990600"/>
-          </a:xfrm>
-        </p:spPr>
-        <p:txBody>
-          <a:bodyPr>
-            <a:normAutofit/>
-          </a:bodyPr>
-          <a:lstStyle/>
-          <a:p>
-            <a:pPr algn="ctr"/>
-            <a:r>
-              <a:rPr lang="en-US" b="1" dirty="0" smtClean="0"/>
-              <a:t>Robert Southey on </a:t>
-            </a:r>
-            <a:r>
-              <a:rPr lang="en-US" b="1" i="1" dirty="0" err="1" smtClean="0"/>
-              <a:t>Amadís</a:t>
-            </a:r>
-            <a:endParaRPr lang="en-US" dirty="0"/>
-          </a:p>
-        </p:txBody>
-      </p:sp>
-    </p:spTree>
-    <p:extLst>
-      <p:ext uri="{BB962C8B-B14F-4D97-AF65-F5344CB8AC3E}">
-        <p14:creationId xmlns:p14="http://schemas.microsoft.com/office/powerpoint/2010/main" val="3400376993"/>
-      </p:ext>
-    </p:extLst>
-  </p:cSld>
-  <p:clrMapOvr>
-    <a:masterClrMapping/>
-  </p:clrMapOvr>
-  <p:timing>
-    <p:tnLst>
-      <p:par>
-        <p:cTn xmlns:p14="http://schemas.microsoft.com/office/powerpoint/2010/main" id="1" dur="indefinite" restart="never" nodeType="tmRoot"/>
-      </p:par>
-    </p:tnLst>
-  </p:timing>
-</p:sld>
-</file>
-
-<file path=ppt/slides/slide18.xml><?xml version="1.0" encoding="utf-8"?>
+<file path=ppt/slides/slide13.xml><?xml version="1.0" encoding="utf-8"?>
 <p:sld xmlns:a="http://schemas.openxmlformats.org/drawingml/2006/main" xmlns:r="http://schemas.openxmlformats.org/officeDocument/2006/relationships" xmlns:p="http://schemas.openxmlformats.org/presentationml/2006/main">
   <p:cSld>
     <p:spTree>
@@ -9354,201 +6214,7 @@
 </p:sld>
 </file>
 
-<file path=ppt/slides/slide19.xml><?xml version="1.0" encoding="utf-8"?>
-<p:sld xmlns:a="http://schemas.openxmlformats.org/drawingml/2006/main" xmlns:r="http://schemas.openxmlformats.org/officeDocument/2006/relationships" xmlns:p="http://schemas.openxmlformats.org/presentationml/2006/main">
-  <p:cSld>
-    <p:spTree>
-      <p:nvGrpSpPr>
-        <p:cNvPr id="1" name=""/>
-        <p:cNvGrpSpPr/>
-        <p:nvPr/>
-      </p:nvGrpSpPr>
-      <p:grpSpPr>
-        <a:xfrm>
-          <a:off x="0" y="0"/>
-          <a:ext cx="0" cy="0"/>
-          <a:chOff x="0" y="0"/>
-          <a:chExt cx="0" cy="0"/>
-        </a:xfrm>
-      </p:grpSpPr>
-      <p:pic>
-        <p:nvPicPr>
-          <p:cNvPr id="3" name="Content Placeholder 2" descr="Screen Shot 2015-10-29 at 9.58.12 AM.png"/>
-          <p:cNvPicPr>
-            <a:picLocks noGrp="1" noChangeAspect="1"/>
-          </p:cNvPicPr>
-          <p:nvPr>
-            <p:ph idx="1"/>
-          </p:nvPr>
-        </p:nvPicPr>
-        <p:blipFill>
-          <a:blip r:embed="rId3" cstate="email">
-            <a:extLst>
-              <a:ext uri="{28A0092B-C50C-407E-A947-70E740481C1C}">
-                <a14:useLocalDpi xmlns:a14="http://schemas.microsoft.com/office/drawing/2010/main" val="0"/>
-              </a:ext>
-            </a:extLst>
-          </a:blip>
-          <a:srcRect t="-33585" b="-33585"/>
-          <a:stretch>
-            <a:fillRect/>
-          </a:stretch>
-        </p:blipFill>
-        <p:spPr>
-          <a:xfrm>
-            <a:off x="67362" y="527538"/>
-            <a:ext cx="8938365" cy="5296809"/>
-          </a:xfrm>
-        </p:spPr>
-      </p:pic>
-    </p:spTree>
-    <p:extLst>
-      <p:ext uri="{BB962C8B-B14F-4D97-AF65-F5344CB8AC3E}">
-        <p14:creationId xmlns:p14="http://schemas.microsoft.com/office/powerpoint/2010/main" val="371922750"/>
-      </p:ext>
-    </p:extLst>
-  </p:cSld>
-  <p:clrMapOvr>
-    <a:masterClrMapping/>
-  </p:clrMapOvr>
-  <p:timing>
-    <p:tnLst>
-      <p:par>
-        <p:cTn xmlns:p14="http://schemas.microsoft.com/office/powerpoint/2010/main" id="1" dur="indefinite" restart="never" nodeType="tmRoot"/>
-      </p:par>
-    </p:tnLst>
-  </p:timing>
-</p:sld>
-</file>
-
-<file path=ppt/slides/slide2.xml><?xml version="1.0" encoding="utf-8"?>
-<p:sld xmlns:a="http://schemas.openxmlformats.org/drawingml/2006/main" xmlns:r="http://schemas.openxmlformats.org/officeDocument/2006/relationships" xmlns:p="http://schemas.openxmlformats.org/presentationml/2006/main">
-  <p:cSld>
-    <p:spTree>
-      <p:nvGrpSpPr>
-        <p:cNvPr id="1" name=""/>
-        <p:cNvGrpSpPr/>
-        <p:nvPr/>
-      </p:nvGrpSpPr>
-      <p:grpSpPr>
-        <a:xfrm>
-          <a:off x="0" y="0"/>
-          <a:ext cx="0" cy="0"/>
-          <a:chOff x="0" y="0"/>
-          <a:chExt cx="0" cy="0"/>
-        </a:xfrm>
-      </p:grpSpPr>
-      <p:pic>
-        <p:nvPicPr>
-          <p:cNvPr id="3" name="Content Placeholder 2" descr="Screen Shot 2015-10-29 at 9.42.23 AM.png"/>
-          <p:cNvPicPr>
-            <a:picLocks noGrp="1" noChangeAspect="1"/>
-          </p:cNvPicPr>
-          <p:nvPr>
-            <p:ph idx="1"/>
-          </p:nvPr>
-        </p:nvPicPr>
-        <p:blipFill>
-          <a:blip r:embed="rId3" cstate="email">
-            <a:extLst>
-              <a:ext uri="{28A0092B-C50C-407E-A947-70E740481C1C}">
-                <a14:useLocalDpi xmlns:a14="http://schemas.microsoft.com/office/drawing/2010/main" val="0"/>
-              </a:ext>
-            </a:extLst>
-          </a:blip>
-          <a:srcRect t="-8711" b="-8711"/>
-          <a:stretch>
-            <a:fillRect/>
-          </a:stretch>
-        </p:blipFill>
-        <p:spPr>
-          <a:xfrm>
-            <a:off x="457200" y="522044"/>
-            <a:ext cx="8229600" cy="4876800"/>
-          </a:xfrm>
-        </p:spPr>
-      </p:pic>
-      <p:sp>
-        <p:nvSpPr>
-          <p:cNvPr id="2" name="TextBox 1"/>
-          <p:cNvSpPr txBox="1"/>
-          <p:nvPr/>
-        </p:nvSpPr>
-        <p:spPr>
-          <a:xfrm>
-            <a:off x="594863" y="5214178"/>
-            <a:ext cx="6125475" cy="646331"/>
-          </a:xfrm>
-          <a:prstGeom prst="rect">
-            <a:avLst/>
-          </a:prstGeom>
-          <a:noFill/>
-        </p:spPr>
-        <p:txBody>
-          <a:bodyPr wrap="square" rtlCol="0">
-            <a:spAutoFit/>
-          </a:bodyPr>
-          <a:lstStyle/>
-          <a:p>
-            <a:r>
-              <a:rPr lang="en-US" dirty="0" err="1" smtClean="0"/>
-              <a:t>amadis.newtfire.org</a:t>
-            </a:r>
-            <a:endParaRPr lang="en-US" dirty="0" smtClean="0"/>
-          </a:p>
-          <a:p>
-            <a:r>
-              <a:rPr lang="en-US" dirty="0"/>
-              <a:t>https://</a:t>
-            </a:r>
-            <a:r>
-              <a:rPr lang="en-US" dirty="0" err="1"/>
-              <a:t>github.com</a:t>
-            </a:r>
-            <a:r>
-              <a:rPr lang="en-US" dirty="0"/>
-              <a:t>/</a:t>
-            </a:r>
-            <a:r>
-              <a:rPr lang="en-US" dirty="0" err="1"/>
-              <a:t>ebeshero</a:t>
-            </a:r>
-            <a:r>
-              <a:rPr lang="en-US" dirty="0"/>
-              <a:t>/</a:t>
-            </a:r>
-            <a:r>
-              <a:rPr lang="en-US" dirty="0" err="1"/>
-              <a:t>Amadis</a:t>
-            </a:r>
-            <a:r>
-              <a:rPr lang="en-US" dirty="0"/>
-              <a:t>-in-Translation</a:t>
-            </a:r>
-          </a:p>
-        </p:txBody>
-      </p:sp>
-    </p:spTree>
-    <p:extLst>
-      <p:ext uri="{BB962C8B-B14F-4D97-AF65-F5344CB8AC3E}">
-        <p14:creationId xmlns:p14="http://schemas.microsoft.com/office/powerpoint/2010/main" val="1190386664"/>
-      </p:ext>
-    </p:extLst>
-  </p:cSld>
-  <p:clrMapOvr>
-    <a:masterClrMapping/>
-  </p:clrMapOvr>
-  <p:timing>
-    <p:tnLst>
-      <p:par>
-        <p:cTn xmlns:p14="http://schemas.microsoft.com/office/powerpoint/2010/main" id="1" dur="indefinite" restart="never" nodeType="tmRoot"/>
-      </p:par>
-    </p:tnLst>
-  </p:timing>
-</p:sld>
-</file>
-
-<file path=ppt/slides/slide20.xml><?xml version="1.0" encoding="utf-8"?>
+<file path=ppt/slides/slide14.xml><?xml version="1.0" encoding="utf-8"?>
 <p:sld xmlns:a="http://schemas.openxmlformats.org/drawingml/2006/main" xmlns:r="http://schemas.openxmlformats.org/officeDocument/2006/relationships" xmlns:p="http://schemas.openxmlformats.org/presentationml/2006/main">
   <p:cSld>
     <p:spTree>
@@ -9610,7 +6276,7 @@
 </p:sld>
 </file>
 
-<file path=ppt/slides/slide21.xml><?xml version="1.0" encoding="utf-8"?>
+<file path=ppt/slides/slide15.xml><?xml version="1.0" encoding="utf-8"?>
 <p:sld xmlns:a="http://schemas.openxmlformats.org/drawingml/2006/main" xmlns:r="http://schemas.openxmlformats.org/officeDocument/2006/relationships" xmlns:p="http://schemas.openxmlformats.org/presentationml/2006/main">
   <p:cSld>
     <p:spTree>
@@ -9707,7 +6373,7 @@
 </p:sld>
 </file>
 
-<file path=ppt/slides/slide22.xml><?xml version="1.0" encoding="utf-8"?>
+<file path=ppt/slides/slide16.xml><?xml version="1.0" encoding="utf-8"?>
 <p:sld xmlns:a="http://schemas.openxmlformats.org/drawingml/2006/main" xmlns:r="http://schemas.openxmlformats.org/officeDocument/2006/relationships" xmlns:p="http://schemas.openxmlformats.org/presentationml/2006/main">
   <p:cSld>
     <p:spTree>
@@ -9726,6 +6392,122 @@
       </p:grpSpPr>
       <p:sp>
         <p:nvSpPr>
+          <p:cNvPr id="2" name="Content Placeholder 1"/>
+          <p:cNvSpPr>
+            <a:spLocks noGrp="1"/>
+          </p:cNvSpPr>
+          <p:nvPr>
+            <p:ph idx="1"/>
+          </p:nvPr>
+        </p:nvSpPr>
+        <p:spPr>
+          <a:xfrm>
+            <a:off x="625507" y="2227479"/>
+            <a:ext cx="8229600" cy="4091214"/>
+          </a:xfrm>
+        </p:spPr>
+        <p:txBody>
+          <a:bodyPr>
+            <a:normAutofit/>
+          </a:bodyPr>
+          <a:lstStyle/>
+          <a:p>
+            <a:pPr marL="0" indent="0">
+              <a:lnSpc>
+                <a:spcPct val="130000"/>
+              </a:lnSpc>
+              <a:buNone/>
+            </a:pPr>
+            <a:r>
+              <a:rPr lang="en-US" sz="2800" dirty="0" smtClean="0"/>
+              <a:t>“To </a:t>
+            </a:r>
+            <a:r>
+              <a:rPr lang="en-US" sz="2800" dirty="0"/>
+              <a:t>have translated a closely printed folio would have been absurd. I have reduced it to about half its length, by abridging the words, not the story […] There is no vanity in saying, that this has improved the book, for what long work may not be improved by compression</a:t>
+            </a:r>
+            <a:r>
+              <a:rPr lang="en-US" sz="2800" dirty="0" smtClean="0"/>
+              <a:t>?”</a:t>
+            </a:r>
+            <a:endParaRPr lang="en-US" sz="2800" dirty="0"/>
+          </a:p>
+        </p:txBody>
+      </p:sp>
+      <p:sp>
+        <p:nvSpPr>
+          <p:cNvPr id="4" name="Title 1"/>
+          <p:cNvSpPr>
+            <a:spLocks noGrp="1"/>
+          </p:cNvSpPr>
+          <p:nvPr>
+            <p:ph type="title"/>
+          </p:nvPr>
+        </p:nvSpPr>
+        <p:spPr>
+          <a:xfrm>
+            <a:off x="227691" y="869989"/>
+            <a:ext cx="8229600" cy="990600"/>
+          </a:xfrm>
+        </p:spPr>
+        <p:txBody>
+          <a:bodyPr>
+            <a:normAutofit/>
+          </a:bodyPr>
+          <a:lstStyle/>
+          <a:p>
+            <a:pPr algn="ctr"/>
+            <a:r>
+              <a:rPr lang="en-US" b="1" dirty="0" smtClean="0"/>
+              <a:t>Robert Southey on </a:t>
+            </a:r>
+            <a:r>
+              <a:rPr lang="en-US" b="1" i="1" dirty="0" err="1" smtClean="0"/>
+              <a:t>Amadís</a:t>
+            </a:r>
+            <a:endParaRPr lang="en-US" dirty="0"/>
+          </a:p>
+        </p:txBody>
+      </p:sp>
+    </p:spTree>
+    <p:extLst>
+      <p:ext uri="{BB962C8B-B14F-4D97-AF65-F5344CB8AC3E}">
+        <p14:creationId xmlns:p14="http://schemas.microsoft.com/office/powerpoint/2010/main" val="3400376993"/>
+      </p:ext>
+    </p:extLst>
+  </p:cSld>
+  <p:clrMapOvr>
+    <a:masterClrMapping/>
+  </p:clrMapOvr>
+  <p:timing>
+    <p:tnLst>
+      <p:par>
+        <p:cTn xmlns:p14="http://schemas.microsoft.com/office/powerpoint/2010/main" id="1" dur="indefinite" restart="never" nodeType="tmRoot"/>
+      </p:par>
+    </p:tnLst>
+  </p:timing>
+</p:sld>
+</file>
+
+<file path=ppt/slides/slide17.xml><?xml version="1.0" encoding="utf-8"?>
+<p:sld xmlns:a="http://schemas.openxmlformats.org/drawingml/2006/main" xmlns:r="http://schemas.openxmlformats.org/officeDocument/2006/relationships" xmlns:p="http://schemas.openxmlformats.org/presentationml/2006/main">
+  <p:cSld>
+    <p:spTree>
+      <p:nvGrpSpPr>
+        <p:cNvPr id="1" name=""/>
+        <p:cNvGrpSpPr/>
+        <p:nvPr/>
+      </p:nvGrpSpPr>
+      <p:grpSpPr>
+        <a:xfrm>
+          <a:off x="0" y="0"/>
+          <a:ext cx="0" cy="0"/>
+          <a:chOff x="0" y="0"/>
+          <a:chExt cx="0" cy="0"/>
+        </a:xfrm>
+      </p:grpSpPr>
+      <p:sp>
+        <p:nvSpPr>
           <p:cNvPr id="5" name="TextBox 4"/>
           <p:cNvSpPr txBox="1"/>
           <p:nvPr/>
@@ -9733,7 +6515,7 @@
         <p:spPr>
           <a:xfrm>
             <a:off x="351692" y="574431"/>
-            <a:ext cx="8475785" cy="5324534"/>
+            <a:ext cx="8475785" cy="6063197"/>
           </a:xfrm>
           <a:prstGeom prst="rect">
             <a:avLst/>
@@ -9766,8 +6548,22 @@
             </a:pPr>
             <a:r>
               <a:rPr lang="en-US" sz="2400" dirty="0" smtClean="0"/>
-              <a:t>Finish coding Montalvo’s Book I and “synch” with Southey encoding. </a:t>
-            </a:r>
+              <a:t>Finish </a:t>
+            </a:r>
+            <a:r>
+              <a:rPr lang="en-US" sz="2400" dirty="0" smtClean="0"/>
+              <a:t>transcribing </a:t>
+            </a:r>
+            <a:r>
+              <a:rPr lang="en-US" sz="2400" dirty="0" smtClean="0"/>
+              <a:t>Montalvo’s Book I and </a:t>
+            </a:r>
+            <a:r>
+              <a:rPr lang="en-US" sz="2400" dirty="0" smtClean="0"/>
+              <a:t>find correspondences with Southey </a:t>
+            </a:r>
+          </a:p>
+          <a:p>
             <a:endParaRPr lang="en-US" sz="2400" dirty="0"/>
           </a:p>
           <a:p>
@@ -9781,64 +6577,67 @@
             </a:r>
           </a:p>
           <a:p>
-            <a:pPr marL="457200" indent="-457200">
-              <a:buFont typeface="Arial" panose="020B0604020202020204" pitchFamily="34" charset="0"/>
+            <a:endParaRPr lang="en-US" sz="2400" dirty="0" smtClean="0"/>
+          </a:p>
+          <a:p>
+            <a:r>
+              <a:rPr lang="en-US" sz="2400" dirty="0" smtClean="0"/>
+              <a:t>Long-range </a:t>
+            </a:r>
+            <a:r>
+              <a:rPr lang="en-US" sz="2400" dirty="0" smtClean="0"/>
+              <a:t>questions: </a:t>
+            </a:r>
+          </a:p>
+          <a:p>
+            <a:endParaRPr lang="en-US" sz="2400" dirty="0"/>
+          </a:p>
+          <a:p>
+            <a:pPr marL="342900" indent="-342900">
+              <a:buFont typeface="Arial"/>
               <a:buChar char="•"/>
             </a:pPr>
             <a:r>
-              <a:rPr lang="en-US" sz="2400" dirty="0"/>
-              <a:t>Train an OCR method to assist us. </a:t>
-            </a:r>
-            <a:endParaRPr lang="en-US" sz="2400" dirty="0" smtClean="0"/>
-          </a:p>
-          <a:p>
-            <a:pPr lvl="7"/>
-            <a:r>
-              <a:rPr lang="en-US" sz="2400" dirty="0" smtClean="0"/>
-              <a:t>Then….</a:t>
+              <a:rPr lang="en-US" sz="2400" b="1" dirty="0" smtClean="0"/>
+              <a:t>How does Southey translate culture and ideology?</a:t>
             </a:r>
           </a:p>
           <a:p>
             <a:pPr marL="342900" indent="-342900">
-              <a:buFont typeface="Arial" panose="020B0604020202020204" pitchFamily="34" charset="0"/>
+              <a:buFont typeface="Arial"/>
               <a:buChar char="•"/>
             </a:pPr>
-            <a:r>
-              <a:rPr lang="en-US" sz="2400" dirty="0" smtClean="0"/>
-              <a:t>Code the two French and two English translations and apply the same markup to compare the kinds of change</a:t>
-            </a:r>
-          </a:p>
-          <a:p>
-            <a:endParaRPr lang="en-US" sz="2400" dirty="0" smtClean="0"/>
-          </a:p>
-          <a:p>
-            <a:r>
-              <a:rPr lang="en-US" sz="2400" dirty="0" smtClean="0"/>
-              <a:t>Long-range question: </a:t>
-            </a:r>
+            <a:endParaRPr lang="en-US" sz="2400" b="1" dirty="0"/>
           </a:p>
           <a:p>
             <a:pPr marL="342900" indent="-342900">
-              <a:buFont typeface="Arial" panose="020B0604020202020204" pitchFamily="34" charset="0"/>
+              <a:buFont typeface="Arial"/>
               <a:buChar char="•"/>
             </a:pPr>
             <a:r>
               <a:rPr lang="en-US" sz="2400" b="1" dirty="0" smtClean="0"/>
-              <a:t>What does life cycle and translation cycle of </a:t>
-            </a:r>
-            <a:r>
-              <a:rPr lang="en-US" sz="2400" b="1" dirty="0" err="1" smtClean="0"/>
-              <a:t>Amadis</a:t>
-            </a:r>
+              <a:t>What is “English” about Southey’s text? </a:t>
+            </a:r>
+          </a:p>
+          <a:p>
+            <a:pPr marL="342900" indent="-342900">
+              <a:buFont typeface="Arial"/>
+              <a:buChar char="•"/>
+            </a:pPr>
+            <a:endParaRPr lang="en-US" sz="2400" b="1" dirty="0"/>
+          </a:p>
+          <a:p>
+            <a:pPr marL="342900" indent="-342900">
+              <a:buFont typeface="Arial"/>
+              <a:buChar char="•"/>
+            </a:pPr>
             <a:r>
               <a:rPr lang="en-US" sz="2400" b="1" dirty="0" smtClean="0"/>
-              <a:t> tell us about the way fiction is translated across genres, cultures, centuries</a:t>
-            </a:r>
-            <a:r>
-              <a:rPr lang="en-US" b="1" dirty="0" smtClean="0"/>
-              <a:t>?</a:t>
-            </a:r>
-            <a:endParaRPr lang="en-US" sz="2400" b="1" dirty="0" smtClean="0"/>
+              <a:t>What is “French” or “Spanish” about other translations and adaptations?</a:t>
+            </a:r>
+          </a:p>
+          <a:p>
+            <a:endParaRPr lang="en-US" sz="2400" dirty="0" smtClean="0"/>
           </a:p>
         </p:txBody>
       </p:sp>
@@ -9846,6 +6645,133 @@
     <p:extLst>
       <p:ext uri="{BB962C8B-B14F-4D97-AF65-F5344CB8AC3E}">
         <p14:creationId xmlns:p14="http://schemas.microsoft.com/office/powerpoint/2010/main" val="2889790714"/>
+      </p:ext>
+    </p:extLst>
+  </p:cSld>
+  <p:clrMapOvr>
+    <a:masterClrMapping/>
+  </p:clrMapOvr>
+  <p:timing>
+    <p:tnLst>
+      <p:par>
+        <p:cTn xmlns:p14="http://schemas.microsoft.com/office/powerpoint/2010/main" id="1" dur="indefinite" restart="never" nodeType="tmRoot"/>
+      </p:par>
+    </p:tnLst>
+  </p:timing>
+</p:sld>
+</file>
+
+<file path=ppt/slides/slide2.xml><?xml version="1.0" encoding="utf-8"?>
+<p:sld xmlns:a="http://schemas.openxmlformats.org/drawingml/2006/main" xmlns:r="http://schemas.openxmlformats.org/officeDocument/2006/relationships" xmlns:p="http://schemas.openxmlformats.org/presentationml/2006/main">
+  <p:cSld>
+    <p:spTree>
+      <p:nvGrpSpPr>
+        <p:cNvPr id="1" name=""/>
+        <p:cNvGrpSpPr/>
+        <p:nvPr/>
+      </p:nvGrpSpPr>
+      <p:grpSpPr>
+        <a:xfrm>
+          <a:off x="0" y="0"/>
+          <a:ext cx="0" cy="0"/>
+          <a:chOff x="0" y="0"/>
+          <a:chExt cx="0" cy="0"/>
+        </a:xfrm>
+      </p:grpSpPr>
+      <p:pic>
+        <p:nvPicPr>
+          <p:cNvPr id="3" name="Content Placeholder 2" descr="Screen Shot 2015-10-29 at 9.42.23 AM.png"/>
+          <p:cNvPicPr>
+            <a:picLocks noGrp="1" noChangeAspect="1"/>
+          </p:cNvPicPr>
+          <p:nvPr>
+            <p:ph idx="1"/>
+          </p:nvPr>
+        </p:nvPicPr>
+        <p:blipFill>
+          <a:blip r:embed="rId3" cstate="email">
+            <a:extLst>
+              <a:ext uri="{28A0092B-C50C-407E-A947-70E740481C1C}">
+                <a14:useLocalDpi xmlns:a14="http://schemas.microsoft.com/office/drawing/2010/main" val="0"/>
+              </a:ext>
+            </a:extLst>
+          </a:blip>
+          <a:srcRect t="-8711" b="-8711"/>
+          <a:stretch>
+            <a:fillRect/>
+          </a:stretch>
+        </p:blipFill>
+        <p:spPr>
+          <a:xfrm>
+            <a:off x="457200" y="522044"/>
+            <a:ext cx="8229600" cy="4876800"/>
+          </a:xfrm>
+        </p:spPr>
+      </p:pic>
+      <p:sp>
+        <p:nvSpPr>
+          <p:cNvPr id="2" name="TextBox 1"/>
+          <p:cNvSpPr txBox="1"/>
+          <p:nvPr/>
+        </p:nvSpPr>
+        <p:spPr>
+          <a:xfrm>
+            <a:off x="594863" y="5214178"/>
+            <a:ext cx="6125475" cy="646331"/>
+          </a:xfrm>
+          <a:prstGeom prst="rect">
+            <a:avLst/>
+          </a:prstGeom>
+          <a:noFill/>
+        </p:spPr>
+        <p:txBody>
+          <a:bodyPr wrap="square" rtlCol="0">
+            <a:spAutoFit/>
+          </a:bodyPr>
+          <a:lstStyle/>
+          <a:p>
+            <a:r>
+              <a:rPr lang="en-US" dirty="0" err="1" smtClean="0"/>
+              <a:t>amadis.newtfire.org</a:t>
+            </a:r>
+            <a:endParaRPr lang="en-US" dirty="0" smtClean="0"/>
+          </a:p>
+          <a:p>
+            <a:r>
+              <a:rPr lang="en-US" dirty="0"/>
+              <a:t>https://</a:t>
+            </a:r>
+            <a:r>
+              <a:rPr lang="en-US" dirty="0" err="1"/>
+              <a:t>github.com</a:t>
+            </a:r>
+            <a:r>
+              <a:rPr lang="en-US" dirty="0"/>
+              <a:t>/</a:t>
+            </a:r>
+            <a:r>
+              <a:rPr lang="en-US" dirty="0" err="1"/>
+              <a:t>ebeshero</a:t>
+            </a:r>
+            <a:r>
+              <a:rPr lang="en-US" dirty="0"/>
+              <a:t>/</a:t>
+            </a:r>
+            <a:r>
+              <a:rPr lang="en-US" dirty="0" err="1"/>
+              <a:t>Amadis</a:t>
+            </a:r>
+            <a:r>
+              <a:rPr lang="en-US" dirty="0"/>
+              <a:t>-in-Translation</a:t>
+            </a:r>
+          </a:p>
+        </p:txBody>
+      </p:sp>
+    </p:spTree>
+    <p:extLst>
+      <p:ext uri="{BB962C8B-B14F-4D97-AF65-F5344CB8AC3E}">
+        <p14:creationId xmlns:p14="http://schemas.microsoft.com/office/powerpoint/2010/main" val="1190386664"/>
       </p:ext>
     </p:extLst>
   </p:cSld>

</xml_diff>